<commit_message>
Codified Lists. Fixed title page.
</commit_message>
<xml_diff>
--- a/powerpoint_diagrams/gr_2.pptx
+++ b/powerpoint_diagrams/gr_2.pptx
@@ -13501,10 +13501,10 @@
       </p:grpSpPr>
       <p:grpSp>
         <p:nvGrpSpPr>
-          <p:cNvPr id="57" name="Group 56">
+          <p:cNvPr id="188" name="Group 187">
             <a:extLst>
               <a:ext uri="{FF2B5EF4-FFF2-40B4-BE49-F238E27FC236}">
-                <a16:creationId xmlns:a16="http://schemas.microsoft.com/office/drawing/2014/main" id="{DB0D3567-EA70-A1BC-D808-CFA9D080FA7C}"/>
+                <a16:creationId xmlns:a16="http://schemas.microsoft.com/office/drawing/2014/main" id="{078CC439-5C59-B236-6108-9B19B7FE32BF}"/>
               </a:ext>
             </a:extLst>
           </p:cNvPr>
@@ -13512,19 +13512,19 @@
           <p:nvPr/>
         </p:nvGrpSpPr>
         <p:grpSpPr>
-          <a:xfrm rot="16200000">
-            <a:off x="3267237" y="2490889"/>
-            <a:ext cx="309" cy="2299084"/>
-            <a:chOff x="4171845" y="1741275"/>
-            <a:chExt cx="309" cy="2299084"/>
+          <a:xfrm rot="10800000">
+            <a:off x="4491261" y="3703573"/>
+            <a:ext cx="8976" cy="696984"/>
+            <a:chOff x="6137987" y="1723795"/>
+            <a:chExt cx="8976" cy="696984"/>
           </a:xfrm>
         </p:grpSpPr>
         <p:cxnSp>
           <p:nvCxnSpPr>
-            <p:cNvPr id="58" name="Straight Arrow Connector 57">
+            <p:cNvPr id="189" name="Straight Arrow Connector 188">
               <a:extLst>
                 <a:ext uri="{FF2B5EF4-FFF2-40B4-BE49-F238E27FC236}">
-                  <a16:creationId xmlns:a16="http://schemas.microsoft.com/office/drawing/2014/main" id="{DC332960-8B0F-B802-85A7-91A9178ACC12}"/>
+                  <a16:creationId xmlns:a16="http://schemas.microsoft.com/office/drawing/2014/main" id="{7FE728CC-1C34-57EA-898D-FF19ECD5EF4F}"/>
                 </a:ext>
               </a:extLst>
             </p:cNvPr>
@@ -13534,9 +13534,9 @@
             <p:nvPr/>
           </p:nvCxnSpPr>
           <p:spPr>
-            <a:xfrm>
-              <a:off x="4171845" y="1741275"/>
-              <a:ext cx="0" cy="1233801"/>
+            <a:xfrm flipV="1">
+              <a:off x="6140609" y="1969589"/>
+              <a:ext cx="0" cy="434317"/>
             </a:xfrm>
             <a:prstGeom prst="straightConnector1">
               <a:avLst/>
@@ -13566,10 +13566,10 @@
         </p:cxnSp>
         <p:cxnSp>
           <p:nvCxnSpPr>
-            <p:cNvPr id="59" name="Straight Arrow Connector 58">
+            <p:cNvPr id="190" name="Straight Arrow Connector 189">
               <a:extLst>
                 <a:ext uri="{FF2B5EF4-FFF2-40B4-BE49-F238E27FC236}">
-                  <a16:creationId xmlns:a16="http://schemas.microsoft.com/office/drawing/2014/main" id="{49414269-F4D9-8707-3997-D85C3A181691}"/>
+                  <a16:creationId xmlns:a16="http://schemas.microsoft.com/office/drawing/2014/main" id="{718349FD-8F6B-9613-1C23-1F9F76BD2A65}"/>
                 </a:ext>
               </a:extLst>
             </p:cNvPr>
@@ -13579,9 +13579,120 @@
             <p:nvPr/>
           </p:nvCxnSpPr>
           <p:spPr>
-            <a:xfrm>
-              <a:off x="4172154" y="2890816"/>
-              <a:ext cx="0" cy="1149543"/>
+            <a:xfrm flipH="1" flipV="1">
+              <a:off x="6137987" y="1723795"/>
+              <a:ext cx="8976" cy="696984"/>
+            </a:xfrm>
+            <a:prstGeom prst="straightConnector1">
+              <a:avLst/>
+            </a:prstGeom>
+            <a:ln w="38100">
+              <a:solidFill>
+                <a:srgbClr val="FF0000"/>
+              </a:solidFill>
+              <a:prstDash val="solid"/>
+              <a:tailEnd type="none"/>
+            </a:ln>
+          </p:spPr>
+          <p:style>
+            <a:lnRef idx="1">
+              <a:schemeClr val="accent1"/>
+            </a:lnRef>
+            <a:fillRef idx="0">
+              <a:schemeClr val="accent1"/>
+            </a:fillRef>
+            <a:effectRef idx="0">
+              <a:schemeClr val="accent1"/>
+            </a:effectRef>
+            <a:fontRef idx="minor">
+              <a:schemeClr val="tx1"/>
+            </a:fontRef>
+          </p:style>
+        </p:cxnSp>
+      </p:grpSp>
+      <p:grpSp>
+        <p:nvGrpSpPr>
+          <p:cNvPr id="191" name="Group 190">
+            <a:extLst>
+              <a:ext uri="{FF2B5EF4-FFF2-40B4-BE49-F238E27FC236}">
+                <a16:creationId xmlns:a16="http://schemas.microsoft.com/office/drawing/2014/main" id="{BD42CE25-1E16-7852-74E7-E7A51D2D8773}"/>
+              </a:ext>
+            </a:extLst>
+          </p:cNvPr>
+          <p:cNvGrpSpPr/>
+          <p:nvPr/>
+        </p:nvGrpSpPr>
+        <p:grpSpPr>
+          <a:xfrm>
+            <a:off x="4405314" y="3764185"/>
+            <a:ext cx="8976" cy="696984"/>
+            <a:chOff x="6137987" y="1723795"/>
+            <a:chExt cx="8976" cy="696984"/>
+          </a:xfrm>
+        </p:grpSpPr>
+        <p:cxnSp>
+          <p:nvCxnSpPr>
+            <p:cNvPr id="192" name="Straight Arrow Connector 191">
+              <a:extLst>
+                <a:ext uri="{FF2B5EF4-FFF2-40B4-BE49-F238E27FC236}">
+                  <a16:creationId xmlns:a16="http://schemas.microsoft.com/office/drawing/2014/main" id="{9549B908-37AC-6F2C-2B20-D5354B86378B}"/>
+                </a:ext>
+              </a:extLst>
+            </p:cNvPr>
+            <p:cNvCxnSpPr>
+              <a:cxnSpLocks/>
+            </p:cNvCxnSpPr>
+            <p:nvPr/>
+          </p:nvCxnSpPr>
+          <p:spPr>
+            <a:xfrm flipV="1">
+              <a:off x="6140609" y="1969589"/>
+              <a:ext cx="0" cy="434317"/>
+            </a:xfrm>
+            <a:prstGeom prst="straightConnector1">
+              <a:avLst/>
+            </a:prstGeom>
+            <a:ln w="38100">
+              <a:solidFill>
+                <a:srgbClr val="FF0000"/>
+              </a:solidFill>
+              <a:prstDash val="solid"/>
+              <a:tailEnd type="triangle"/>
+            </a:ln>
+          </p:spPr>
+          <p:style>
+            <a:lnRef idx="1">
+              <a:schemeClr val="accent1"/>
+            </a:lnRef>
+            <a:fillRef idx="0">
+              <a:schemeClr val="accent1"/>
+            </a:fillRef>
+            <a:effectRef idx="0">
+              <a:schemeClr val="accent1"/>
+            </a:effectRef>
+            <a:fontRef idx="minor">
+              <a:schemeClr val="tx1"/>
+            </a:fontRef>
+          </p:style>
+        </p:cxnSp>
+        <p:cxnSp>
+          <p:nvCxnSpPr>
+            <p:cNvPr id="193" name="Straight Arrow Connector 192">
+              <a:extLst>
+                <a:ext uri="{FF2B5EF4-FFF2-40B4-BE49-F238E27FC236}">
+                  <a16:creationId xmlns:a16="http://schemas.microsoft.com/office/drawing/2014/main" id="{5D6FC457-6B2F-D50D-D31C-35EF17D14428}"/>
+                </a:ext>
+              </a:extLst>
+            </p:cNvPr>
+            <p:cNvCxnSpPr>
+              <a:cxnSpLocks/>
+            </p:cNvCxnSpPr>
+            <p:nvPr/>
+          </p:nvCxnSpPr>
+          <p:spPr>
+            <a:xfrm flipH="1" flipV="1">
+              <a:off x="6137987" y="1723795"/>
+              <a:ext cx="8976" cy="696984"/>
             </a:xfrm>
             <a:prstGeom prst="straightConnector1">
               <a:avLst/>
@@ -13628,7 +13739,7 @@
         </p:nvSpPr>
         <p:spPr>
           <a:xfrm>
-            <a:off x="628650" y="498270"/>
+            <a:off x="1451318" y="1032015"/>
             <a:ext cx="7886700" cy="994172"/>
           </a:xfrm>
         </p:spPr>
@@ -13650,55 +13761,6 @@
           </a:p>
         </p:txBody>
       </p:sp>
-      <p:sp>
-        <p:nvSpPr>
-          <p:cNvPr id="9" name="Rectangle 8">
-            <a:extLst>
-              <a:ext uri="{FF2B5EF4-FFF2-40B4-BE49-F238E27FC236}">
-                <a16:creationId xmlns:a16="http://schemas.microsoft.com/office/drawing/2014/main" id="{DF80314B-8294-7794-295C-B9A0C1249921}"/>
-              </a:ext>
-            </a:extLst>
-          </p:cNvPr>
-          <p:cNvSpPr/>
-          <p:nvPr/>
-        </p:nvSpPr>
-        <p:spPr>
-          <a:xfrm>
-            <a:off x="1615629" y="3458331"/>
-            <a:ext cx="508573" cy="363889"/>
-          </a:xfrm>
-          <a:prstGeom prst="rect">
-            <a:avLst/>
-          </a:prstGeom>
-          <a:solidFill>
-            <a:schemeClr val="bg1"/>
-          </a:solidFill>
-        </p:spPr>
-        <p:style>
-          <a:lnRef idx="2">
-            <a:schemeClr val="accent1">
-              <a:shade val="50000"/>
-            </a:schemeClr>
-          </a:lnRef>
-          <a:fillRef idx="1">
-            <a:schemeClr val="accent1"/>
-          </a:fillRef>
-          <a:effectRef idx="0">
-            <a:schemeClr val="accent1"/>
-          </a:effectRef>
-          <a:fontRef idx="minor">
-            <a:schemeClr val="lt1"/>
-          </a:fontRef>
-        </p:style>
-        <p:txBody>
-          <a:bodyPr rtlCol="0" anchor="ctr"/>
-          <a:lstStyle/>
-          <a:p>
-            <a:pPr algn="ctr"/>
-            <a:endParaRPr lang="en-US"/>
-          </a:p>
-        </p:txBody>
-      </p:sp>
       <p:cxnSp>
         <p:nvCxnSpPr>
           <p:cNvPr id="11" name="Straight Connector 10">
@@ -13715,50 +13777,7 @@
         </p:nvCxnSpPr>
         <p:spPr>
           <a:xfrm>
-            <a:off x="4047962" y="1328543"/>
-            <a:ext cx="616993" cy="0"/>
-          </a:xfrm>
-          <a:prstGeom prst="line">
-            <a:avLst/>
-          </a:prstGeom>
-          <a:ln w="63500">
-            <a:solidFill>
-              <a:schemeClr val="bg1"/>
-            </a:solidFill>
-          </a:ln>
-        </p:spPr>
-        <p:style>
-          <a:lnRef idx="1">
-            <a:schemeClr val="accent1"/>
-          </a:lnRef>
-          <a:fillRef idx="0">
-            <a:schemeClr val="accent1"/>
-          </a:fillRef>
-          <a:effectRef idx="0">
-            <a:schemeClr val="accent1"/>
-          </a:effectRef>
-          <a:fontRef idx="minor">
-            <a:schemeClr val="tx1"/>
-          </a:fontRef>
-        </p:style>
-      </p:cxnSp>
-      <p:cxnSp>
-        <p:nvCxnSpPr>
-          <p:cNvPr id="18" name="Straight Connector 17">
-            <a:extLst>
-              <a:ext uri="{FF2B5EF4-FFF2-40B4-BE49-F238E27FC236}">
-                <a16:creationId xmlns:a16="http://schemas.microsoft.com/office/drawing/2014/main" id="{ABEBB34E-7A34-D127-9966-2ECEA51F6B4C}"/>
-              </a:ext>
-            </a:extLst>
-          </p:cNvPr>
-          <p:cNvCxnSpPr>
-            <a:cxnSpLocks/>
-          </p:cNvCxnSpPr>
-          <p:nvPr/>
-        </p:nvCxnSpPr>
-        <p:spPr>
-          <a:xfrm>
-            <a:off x="4047962" y="3055100"/>
+            <a:off x="4098762" y="1328543"/>
             <a:ext cx="616993" cy="0"/>
           </a:xfrm>
           <a:prstGeom prst="line">
@@ -13801,7 +13820,7 @@
         </p:nvCxnSpPr>
         <p:spPr>
           <a:xfrm rot="5400000">
-            <a:off x="6330863" y="3705196"/>
+            <a:off x="6330863" y="3689956"/>
             <a:ext cx="616993" cy="0"/>
           </a:xfrm>
           <a:prstGeom prst="line">
@@ -13844,7 +13863,7 @@
         </p:nvCxnSpPr>
         <p:spPr>
           <a:xfrm rot="5400000">
-            <a:off x="4604306" y="3705196"/>
+            <a:off x="3622871" y="3601434"/>
             <a:ext cx="616993" cy="0"/>
           </a:xfrm>
           <a:prstGeom prst="line">
@@ -13854,51 +13873,6 @@
             <a:solidFill>
               <a:schemeClr val="bg1"/>
             </a:solidFill>
-          </a:ln>
-        </p:spPr>
-        <p:style>
-          <a:lnRef idx="1">
-            <a:schemeClr val="accent1"/>
-          </a:lnRef>
-          <a:fillRef idx="0">
-            <a:schemeClr val="accent1"/>
-          </a:fillRef>
-          <a:effectRef idx="0">
-            <a:schemeClr val="accent1"/>
-          </a:effectRef>
-          <a:fontRef idx="minor">
-            <a:schemeClr val="tx1"/>
-          </a:fontRef>
-        </p:style>
-      </p:cxnSp>
-      <p:cxnSp>
-        <p:nvCxnSpPr>
-          <p:cNvPr id="26" name="Straight Arrow Connector 25">
-            <a:extLst>
-              <a:ext uri="{FF2B5EF4-FFF2-40B4-BE49-F238E27FC236}">
-                <a16:creationId xmlns:a16="http://schemas.microsoft.com/office/drawing/2014/main" id="{F335DFBC-6CAF-AA74-4ECE-77C68FAF70CC}"/>
-              </a:ext>
-            </a:extLst>
-          </p:cNvPr>
-          <p:cNvCxnSpPr>
-            <a:cxnSpLocks/>
-          </p:cNvCxnSpPr>
-          <p:nvPr/>
-        </p:nvCxnSpPr>
-        <p:spPr>
-          <a:xfrm>
-            <a:off x="4423944" y="3840989"/>
-            <a:ext cx="0" cy="475039"/>
-          </a:xfrm>
-          <a:prstGeom prst="straightConnector1">
-            <a:avLst/>
-          </a:prstGeom>
-          <a:ln w="63500">
-            <a:solidFill>
-              <a:srgbClr val="BB1362"/>
-            </a:solidFill>
-            <a:prstDash val="sysDot"/>
-            <a:tailEnd type="triangle"/>
           </a:ln>
         </p:spPr>
         <p:style>
@@ -13930,18 +13904,20 @@
         </p:nvSpPr>
         <p:spPr>
           <a:xfrm>
-            <a:off x="4225254" y="5255390"/>
+            <a:off x="4333755" y="5302395"/>
             <a:ext cx="272699" cy="272699"/>
           </a:xfrm>
           <a:prstGeom prst="ellipse">
             <a:avLst/>
           </a:prstGeom>
           <a:solidFill>
-            <a:schemeClr val="accent1"/>
+            <a:schemeClr val="bg2">
+              <a:lumMod val="50000"/>
+            </a:schemeClr>
           </a:solidFill>
           <a:ln>
             <a:solidFill>
-              <a:schemeClr val="accent1"/>
+              <a:schemeClr val="tx1"/>
             </a:solidFill>
           </a:ln>
         </p:spPr>
@@ -13984,7 +13960,7 @@
         </p:nvSpPr>
         <p:spPr>
           <a:xfrm>
-            <a:off x="4131734" y="5162160"/>
+            <a:off x="4240235" y="5209165"/>
             <a:ext cx="459740" cy="459740"/>
           </a:xfrm>
           <a:prstGeom prst="ellipse">
@@ -13993,7 +13969,7 @@
           <a:noFill/>
           <a:ln w="63500">
             <a:solidFill>
-              <a:schemeClr val="accent1"/>
+              <a:schemeClr val="tx1"/>
             </a:solidFill>
           </a:ln>
         </p:spPr>
@@ -14448,7 +14424,7 @@
         </p:nvSpPr>
         <p:spPr>
           <a:xfrm>
-            <a:off x="4679078" y="1184248"/>
+            <a:off x="5836874" y="2510516"/>
             <a:ext cx="1217521" cy="311921"/>
           </a:xfrm>
           <a:prstGeom prst="rect">
@@ -14653,7 +14629,7 @@
         </p:nvSpPr>
         <p:spPr>
           <a:xfrm>
-            <a:off x="6703757" y="3556945"/>
+            <a:off x="6703757" y="3541705"/>
             <a:ext cx="1217521" cy="311921"/>
           </a:xfrm>
           <a:prstGeom prst="rect">
@@ -15266,7 +15242,7 @@
         </p:nvGrpSpPr>
         <p:grpSpPr>
           <a:xfrm>
-            <a:off x="5769930" y="5556736"/>
+            <a:off x="5192764" y="5160536"/>
             <a:ext cx="1252870" cy="556415"/>
             <a:chOff x="691527" y="3991936"/>
             <a:chExt cx="1697476" cy="753870"/>
@@ -15507,7 +15483,7 @@
             <a:noFill/>
             <a:ln w="38100">
               <a:solidFill>
-                <a:srgbClr val="C00000"/>
+                <a:srgbClr val="FF0000"/>
               </a:solidFill>
             </a:ln>
           </p:spPr>
@@ -15532,7 +15508,11 @@
             <a:lstStyle/>
             <a:p>
               <a:pPr algn="ctr"/>
-              <a:endParaRPr lang="en-GB" sz="1350" dirty="0"/>
+              <a:endParaRPr lang="en-GB" sz="1350" dirty="0">
+                <a:solidFill>
+                  <a:srgbClr val="FF0000"/>
+                </a:solidFill>
+              </a:endParaRPr>
             </a:p>
           </p:txBody>
         </p:sp>
@@ -15746,13 +15726,17 @@
         </p:nvSpPr>
         <p:spPr>
           <a:xfrm>
-            <a:off x="4679078" y="5107358"/>
+            <a:off x="4787579" y="5154363"/>
             <a:ext cx="351515" cy="595953"/>
           </a:xfrm>
           <a:prstGeom prst="leftBrace">
             <a:avLst/>
           </a:prstGeom>
-          <a:ln w="63500"/>
+          <a:ln w="19050">
+            <a:solidFill>
+              <a:schemeClr val="tx1"/>
+            </a:solidFill>
+          </a:ln>
         </p:spPr>
         <p:style>
           <a:lnRef idx="1">
@@ -15777,12 +15761,42 @@
           </a:p>
         </p:txBody>
       </p:sp>
+      <p:pic>
+        <p:nvPicPr>
+          <p:cNvPr id="65" name="Picture 64">
+            <a:extLst>
+              <a:ext uri="{FF2B5EF4-FFF2-40B4-BE49-F238E27FC236}">
+                <a16:creationId xmlns:a16="http://schemas.microsoft.com/office/drawing/2014/main" id="{3356E3DA-1DD0-4FCD-2697-91D1755A9CF5}"/>
+              </a:ext>
+            </a:extLst>
+          </p:cNvPr>
+          <p:cNvPicPr>
+            <a:picLocks noChangeAspect="1"/>
+          </p:cNvPicPr>
+          <p:nvPr/>
+        </p:nvPicPr>
+        <p:blipFill>
+          <a:blip r:embed="rId2"/>
+          <a:stretch>
+            <a:fillRect/>
+          </a:stretch>
+        </p:blipFill>
+        <p:spPr>
+          <a:xfrm>
+            <a:off x="8884648" y="-744980"/>
+            <a:ext cx="3811122" cy="3255496"/>
+          </a:xfrm>
+          <a:prstGeom prst="rect">
+            <a:avLst/>
+          </a:prstGeom>
+        </p:spPr>
+      </p:pic>
       <p:sp>
         <p:nvSpPr>
-          <p:cNvPr id="55" name="Rectangle 54">
+          <p:cNvPr id="68" name="Rectangle 67">
             <a:extLst>
               <a:ext uri="{FF2B5EF4-FFF2-40B4-BE49-F238E27FC236}">
-                <a16:creationId xmlns:a16="http://schemas.microsoft.com/office/drawing/2014/main" id="{6629B0FD-D1DD-6D01-E623-81B1E1A97B16}"/>
+                <a16:creationId xmlns:a16="http://schemas.microsoft.com/office/drawing/2014/main" id="{F80604AF-47C5-EF85-9536-DF5F22C1F1E2}"/>
               </a:ext>
             </a:extLst>
           </p:cNvPr>
@@ -15790,8 +15804,8 @@
           <p:nvPr/>
         </p:nvSpPr>
         <p:spPr>
-          <a:xfrm rot="18900000">
-            <a:off x="3785864" y="3623881"/>
+          <a:xfrm>
+            <a:off x="3779339" y="383310"/>
             <a:ext cx="1276158" cy="122382"/>
           </a:xfrm>
           <a:prstGeom prst="rect">
@@ -15835,66 +15849,10 @@
       </p:sp>
       <p:sp>
         <p:nvSpPr>
-          <p:cNvPr id="60" name="Rectangle 59">
+          <p:cNvPr id="80" name="Rectangle 79">
             <a:extLst>
               <a:ext uri="{FF2B5EF4-FFF2-40B4-BE49-F238E27FC236}">
-                <a16:creationId xmlns:a16="http://schemas.microsoft.com/office/drawing/2014/main" id="{BD71FFE5-FD45-FF59-3DB5-731DDCF7BD63}"/>
-              </a:ext>
-            </a:extLst>
-          </p:cNvPr>
-          <p:cNvSpPr/>
-          <p:nvPr/>
-        </p:nvSpPr>
-        <p:spPr>
-          <a:xfrm>
-            <a:off x="3793559" y="2831476"/>
-            <a:ext cx="1276158" cy="122382"/>
-          </a:xfrm>
-          <a:prstGeom prst="rect">
-            <a:avLst/>
-          </a:prstGeom>
-          <a:solidFill>
-            <a:schemeClr val="bg2">
-              <a:lumMod val="50000"/>
-            </a:schemeClr>
-          </a:solidFill>
-          <a:ln>
-            <a:solidFill>
-              <a:schemeClr val="tx1"/>
-            </a:solidFill>
-          </a:ln>
-        </p:spPr>
-        <p:style>
-          <a:lnRef idx="2">
-            <a:schemeClr val="accent1">
-              <a:shade val="50000"/>
-            </a:schemeClr>
-          </a:lnRef>
-          <a:fillRef idx="1">
-            <a:schemeClr val="accent1"/>
-          </a:fillRef>
-          <a:effectRef idx="0">
-            <a:schemeClr val="accent1"/>
-          </a:effectRef>
-          <a:fontRef idx="minor">
-            <a:schemeClr val="lt1"/>
-          </a:fontRef>
-        </p:style>
-        <p:txBody>
-          <a:bodyPr rtlCol="0" anchor="ctr"/>
-          <a:lstStyle/>
-          <a:p>
-            <a:pPr algn="ctr"/>
-            <a:endParaRPr lang="en-US"/>
-          </a:p>
-        </p:txBody>
-      </p:sp>
-      <p:sp>
-        <p:nvSpPr>
-          <p:cNvPr id="61" name="Rectangle 60">
-            <a:extLst>
-              <a:ext uri="{FF2B5EF4-FFF2-40B4-BE49-F238E27FC236}">
-                <a16:creationId xmlns:a16="http://schemas.microsoft.com/office/drawing/2014/main" id="{FBDE4F20-D202-43BC-EBFA-4050331876E9}"/>
+                <a16:creationId xmlns:a16="http://schemas.microsoft.com/office/drawing/2014/main" id="{89C493B1-84E2-B1A0-0612-1C9B52358515}"/>
               </a:ext>
             </a:extLst>
           </p:cNvPr>
@@ -15903,7 +15861,7 @@
         </p:nvSpPr>
         <p:spPr>
           <a:xfrm rot="5400000">
-            <a:off x="4876243" y="3623881"/>
+            <a:off x="7061594" y="3572074"/>
             <a:ext cx="1276158" cy="122382"/>
           </a:xfrm>
           <a:prstGeom prst="rect">
@@ -15947,10 +15905,121 @@
       </p:sp>
       <p:grpSp>
         <p:nvGrpSpPr>
-          <p:cNvPr id="62" name="Group 61">
+          <p:cNvPr id="100" name="Group 99">
             <a:extLst>
               <a:ext uri="{FF2B5EF4-FFF2-40B4-BE49-F238E27FC236}">
-                <a16:creationId xmlns:a16="http://schemas.microsoft.com/office/drawing/2014/main" id="{30151B8C-EBF4-9C4B-B7CC-F50B047039DE}"/>
+                <a16:creationId xmlns:a16="http://schemas.microsoft.com/office/drawing/2014/main" id="{D910BEE2-3BBF-A939-481E-DD149AE8E853}"/>
+              </a:ext>
+            </a:extLst>
+          </p:cNvPr>
+          <p:cNvGrpSpPr/>
+          <p:nvPr/>
+        </p:nvGrpSpPr>
+        <p:grpSpPr>
+          <a:xfrm rot="5400000">
+            <a:off x="4841960" y="3344067"/>
+            <a:ext cx="8976" cy="696984"/>
+            <a:chOff x="6137987" y="1723795"/>
+            <a:chExt cx="8976" cy="696984"/>
+          </a:xfrm>
+        </p:grpSpPr>
+        <p:cxnSp>
+          <p:nvCxnSpPr>
+            <p:cNvPr id="98" name="Straight Arrow Connector 97">
+              <a:extLst>
+                <a:ext uri="{FF2B5EF4-FFF2-40B4-BE49-F238E27FC236}">
+                  <a16:creationId xmlns:a16="http://schemas.microsoft.com/office/drawing/2014/main" id="{9381288D-00FE-D91B-555B-27D5403776CB}"/>
+                </a:ext>
+              </a:extLst>
+            </p:cNvPr>
+            <p:cNvCxnSpPr>
+              <a:cxnSpLocks/>
+            </p:cNvCxnSpPr>
+            <p:nvPr/>
+          </p:nvCxnSpPr>
+          <p:spPr>
+            <a:xfrm flipV="1">
+              <a:off x="6140609" y="1969589"/>
+              <a:ext cx="0" cy="434317"/>
+            </a:xfrm>
+            <a:prstGeom prst="straightConnector1">
+              <a:avLst/>
+            </a:prstGeom>
+            <a:ln w="38100">
+              <a:solidFill>
+                <a:srgbClr val="FF0000"/>
+              </a:solidFill>
+              <a:prstDash val="solid"/>
+              <a:tailEnd type="triangle"/>
+            </a:ln>
+          </p:spPr>
+          <p:style>
+            <a:lnRef idx="1">
+              <a:schemeClr val="accent1"/>
+            </a:lnRef>
+            <a:fillRef idx="0">
+              <a:schemeClr val="accent1"/>
+            </a:fillRef>
+            <a:effectRef idx="0">
+              <a:schemeClr val="accent1"/>
+            </a:effectRef>
+            <a:fontRef idx="minor">
+              <a:schemeClr val="tx1"/>
+            </a:fontRef>
+          </p:style>
+        </p:cxnSp>
+        <p:cxnSp>
+          <p:nvCxnSpPr>
+            <p:cNvPr id="99" name="Straight Arrow Connector 98">
+              <a:extLst>
+                <a:ext uri="{FF2B5EF4-FFF2-40B4-BE49-F238E27FC236}">
+                  <a16:creationId xmlns:a16="http://schemas.microsoft.com/office/drawing/2014/main" id="{9FFAB8E5-F733-B456-3AF5-461AB354ACFF}"/>
+                </a:ext>
+              </a:extLst>
+            </p:cNvPr>
+            <p:cNvCxnSpPr>
+              <a:cxnSpLocks/>
+            </p:cNvCxnSpPr>
+            <p:nvPr/>
+          </p:nvCxnSpPr>
+          <p:spPr>
+            <a:xfrm flipH="1" flipV="1">
+              <a:off x="6137987" y="1723795"/>
+              <a:ext cx="8976" cy="696984"/>
+            </a:xfrm>
+            <a:prstGeom prst="straightConnector1">
+              <a:avLst/>
+            </a:prstGeom>
+            <a:ln w="38100">
+              <a:solidFill>
+                <a:srgbClr val="FF0000"/>
+              </a:solidFill>
+              <a:prstDash val="solid"/>
+              <a:tailEnd type="none"/>
+            </a:ln>
+          </p:spPr>
+          <p:style>
+            <a:lnRef idx="1">
+              <a:schemeClr val="accent1"/>
+            </a:lnRef>
+            <a:fillRef idx="0">
+              <a:schemeClr val="accent1"/>
+            </a:fillRef>
+            <a:effectRef idx="0">
+              <a:schemeClr val="accent1"/>
+            </a:effectRef>
+            <a:fontRef idx="minor">
+              <a:schemeClr val="tx1"/>
+            </a:fontRef>
+          </p:style>
+        </p:cxnSp>
+      </p:grpSp>
+      <p:grpSp>
+        <p:nvGrpSpPr>
+          <p:cNvPr id="101" name="Group 100">
+            <a:extLst>
+              <a:ext uri="{FF2B5EF4-FFF2-40B4-BE49-F238E27FC236}">
+                <a16:creationId xmlns:a16="http://schemas.microsoft.com/office/drawing/2014/main" id="{4B07CC17-5C11-42C9-35F4-5DF7F789ED5D}"/>
               </a:ext>
             </a:extLst>
           </p:cNvPr>
@@ -15959,7 +16028,7 @@
         </p:nvGrpSpPr>
         <p:grpSpPr>
           <a:xfrm rot="16200000">
-            <a:off x="5521862" y="2490800"/>
+            <a:off x="6479956" y="2436808"/>
             <a:ext cx="309" cy="2299084"/>
             <a:chOff x="4171845" y="1741275"/>
             <a:chExt cx="309" cy="2299084"/>
@@ -15967,10 +16036,10 @@
         </p:grpSpPr>
         <p:cxnSp>
           <p:nvCxnSpPr>
-            <p:cNvPr id="63" name="Straight Arrow Connector 62">
+            <p:cNvPr id="102" name="Straight Arrow Connector 101">
               <a:extLst>
                 <a:ext uri="{FF2B5EF4-FFF2-40B4-BE49-F238E27FC236}">
-                  <a16:creationId xmlns:a16="http://schemas.microsoft.com/office/drawing/2014/main" id="{B77272C3-83BA-D634-25CD-9C5BC2CB58FF}"/>
+                  <a16:creationId xmlns:a16="http://schemas.microsoft.com/office/drawing/2014/main" id="{9278D213-FCAE-D0B0-93E3-882F9EDB92CD}"/>
                 </a:ext>
               </a:extLst>
             </p:cNvPr>
@@ -15987,7 +16056,7 @@
             <a:prstGeom prst="straightConnector1">
               <a:avLst/>
             </a:prstGeom>
-            <a:ln w="38100">
+            <a:ln w="57150">
               <a:solidFill>
                 <a:srgbClr val="FF0000"/>
               </a:solidFill>
@@ -16012,10 +16081,10 @@
         </p:cxnSp>
         <p:cxnSp>
           <p:nvCxnSpPr>
-            <p:cNvPr id="64" name="Straight Arrow Connector 63">
+            <p:cNvPr id="103" name="Straight Arrow Connector 102">
               <a:extLst>
                 <a:ext uri="{FF2B5EF4-FFF2-40B4-BE49-F238E27FC236}">
-                  <a16:creationId xmlns:a16="http://schemas.microsoft.com/office/drawing/2014/main" id="{D50B1FDA-62FD-2B05-B6DC-7740F5DD75F0}"/>
+                  <a16:creationId xmlns:a16="http://schemas.microsoft.com/office/drawing/2014/main" id="{00CF87F1-C215-B809-C2F9-BFA94847AB87}"/>
                 </a:ext>
               </a:extLst>
             </p:cNvPr>
@@ -16032,6 +16101,471 @@
             <a:prstGeom prst="straightConnector1">
               <a:avLst/>
             </a:prstGeom>
+            <a:ln w="57150">
+              <a:solidFill>
+                <a:srgbClr val="FF0000"/>
+              </a:solidFill>
+              <a:prstDash val="solid"/>
+              <a:tailEnd type="none"/>
+            </a:ln>
+          </p:spPr>
+          <p:style>
+            <a:lnRef idx="1">
+              <a:schemeClr val="accent1"/>
+            </a:lnRef>
+            <a:fillRef idx="0">
+              <a:schemeClr val="accent1"/>
+            </a:fillRef>
+            <a:effectRef idx="0">
+              <a:schemeClr val="accent1"/>
+            </a:effectRef>
+            <a:fontRef idx="minor">
+              <a:schemeClr val="tx1"/>
+            </a:fontRef>
+          </p:style>
+        </p:cxnSp>
+      </p:grpSp>
+      <p:grpSp>
+        <p:nvGrpSpPr>
+          <p:cNvPr id="104" name="Group 103">
+            <a:extLst>
+              <a:ext uri="{FF2B5EF4-FFF2-40B4-BE49-F238E27FC236}">
+                <a16:creationId xmlns:a16="http://schemas.microsoft.com/office/drawing/2014/main" id="{4146E5CC-F84C-C84E-78B7-D6F95EC57282}"/>
+              </a:ext>
+            </a:extLst>
+          </p:cNvPr>
+          <p:cNvGrpSpPr/>
+          <p:nvPr/>
+        </p:nvGrpSpPr>
+        <p:grpSpPr>
+          <a:xfrm rot="5400000">
+            <a:off x="6479954" y="2539167"/>
+            <a:ext cx="309" cy="2299084"/>
+            <a:chOff x="4171845" y="1741275"/>
+            <a:chExt cx="309" cy="2299084"/>
+          </a:xfrm>
+        </p:grpSpPr>
+        <p:cxnSp>
+          <p:nvCxnSpPr>
+            <p:cNvPr id="105" name="Straight Arrow Connector 104">
+              <a:extLst>
+                <a:ext uri="{FF2B5EF4-FFF2-40B4-BE49-F238E27FC236}">
+                  <a16:creationId xmlns:a16="http://schemas.microsoft.com/office/drawing/2014/main" id="{299B5F24-D081-1B76-4642-AC755DD365BC}"/>
+                </a:ext>
+              </a:extLst>
+            </p:cNvPr>
+            <p:cNvCxnSpPr>
+              <a:cxnSpLocks/>
+            </p:cNvCxnSpPr>
+            <p:nvPr/>
+          </p:nvCxnSpPr>
+          <p:spPr>
+            <a:xfrm>
+              <a:off x="4171845" y="1741275"/>
+              <a:ext cx="0" cy="1233801"/>
+            </a:xfrm>
+            <a:prstGeom prst="straightConnector1">
+              <a:avLst/>
+            </a:prstGeom>
+            <a:ln w="57150">
+              <a:solidFill>
+                <a:srgbClr val="FF0000"/>
+              </a:solidFill>
+              <a:prstDash val="solid"/>
+              <a:tailEnd type="triangle"/>
+            </a:ln>
+          </p:spPr>
+          <p:style>
+            <a:lnRef idx="1">
+              <a:schemeClr val="accent1"/>
+            </a:lnRef>
+            <a:fillRef idx="0">
+              <a:schemeClr val="accent1"/>
+            </a:fillRef>
+            <a:effectRef idx="0">
+              <a:schemeClr val="accent1"/>
+            </a:effectRef>
+            <a:fontRef idx="minor">
+              <a:schemeClr val="tx1"/>
+            </a:fontRef>
+          </p:style>
+        </p:cxnSp>
+        <p:cxnSp>
+          <p:nvCxnSpPr>
+            <p:cNvPr id="106" name="Straight Arrow Connector 105">
+              <a:extLst>
+                <a:ext uri="{FF2B5EF4-FFF2-40B4-BE49-F238E27FC236}">
+                  <a16:creationId xmlns:a16="http://schemas.microsoft.com/office/drawing/2014/main" id="{6521EC3F-6D69-833E-1335-A5DAC0982046}"/>
+                </a:ext>
+              </a:extLst>
+            </p:cNvPr>
+            <p:cNvCxnSpPr>
+              <a:cxnSpLocks/>
+            </p:cNvCxnSpPr>
+            <p:nvPr/>
+          </p:nvCxnSpPr>
+          <p:spPr>
+            <a:xfrm>
+              <a:off x="4172154" y="2890816"/>
+              <a:ext cx="0" cy="1149543"/>
+            </a:xfrm>
+            <a:prstGeom prst="straightConnector1">
+              <a:avLst/>
+            </a:prstGeom>
+            <a:ln w="57150">
+              <a:solidFill>
+                <a:srgbClr val="FF0000"/>
+              </a:solidFill>
+              <a:prstDash val="solid"/>
+              <a:tailEnd type="none"/>
+            </a:ln>
+          </p:spPr>
+          <p:style>
+            <a:lnRef idx="1">
+              <a:schemeClr val="accent1"/>
+            </a:lnRef>
+            <a:fillRef idx="0">
+              <a:schemeClr val="accent1"/>
+            </a:fillRef>
+            <a:effectRef idx="0">
+              <a:schemeClr val="accent1"/>
+            </a:effectRef>
+            <a:fontRef idx="minor">
+              <a:schemeClr val="tx1"/>
+            </a:fontRef>
+          </p:style>
+        </p:cxnSp>
+      </p:grpSp>
+      <p:grpSp>
+        <p:nvGrpSpPr>
+          <p:cNvPr id="113" name="Group 112">
+            <a:extLst>
+              <a:ext uri="{FF2B5EF4-FFF2-40B4-BE49-F238E27FC236}">
+                <a16:creationId xmlns:a16="http://schemas.microsoft.com/office/drawing/2014/main" id="{B211FEB5-CC2A-BC55-E0AE-C4C2EE5B9988}"/>
+              </a:ext>
+            </a:extLst>
+          </p:cNvPr>
+          <p:cNvGrpSpPr/>
+          <p:nvPr/>
+        </p:nvGrpSpPr>
+        <p:grpSpPr>
+          <a:xfrm rot="5400000">
+            <a:off x="3286164" y="1613887"/>
+            <a:ext cx="2299086" cy="102668"/>
+            <a:chOff x="4047961" y="1696409"/>
+            <a:chExt cx="2299086" cy="102668"/>
+          </a:xfrm>
+        </p:grpSpPr>
+        <p:grpSp>
+          <p:nvGrpSpPr>
+            <p:cNvPr id="107" name="Group 106">
+              <a:extLst>
+                <a:ext uri="{FF2B5EF4-FFF2-40B4-BE49-F238E27FC236}">
+                  <a16:creationId xmlns:a16="http://schemas.microsoft.com/office/drawing/2014/main" id="{545375C5-7F84-9423-4E9E-11A7A44517AC}"/>
+                </a:ext>
+              </a:extLst>
+            </p:cNvPr>
+            <p:cNvGrpSpPr/>
+            <p:nvPr/>
+          </p:nvGrpSpPr>
+          <p:grpSpPr>
+            <a:xfrm rot="16200000">
+              <a:off x="5197350" y="547022"/>
+              <a:ext cx="309" cy="2299084"/>
+              <a:chOff x="4171845" y="1741275"/>
+              <a:chExt cx="309" cy="2299084"/>
+            </a:xfrm>
+          </p:grpSpPr>
+          <p:cxnSp>
+            <p:nvCxnSpPr>
+              <p:cNvPr id="108" name="Straight Arrow Connector 107">
+                <a:extLst>
+                  <a:ext uri="{FF2B5EF4-FFF2-40B4-BE49-F238E27FC236}">
+                    <a16:creationId xmlns:a16="http://schemas.microsoft.com/office/drawing/2014/main" id="{89BDC1EB-ABFE-0671-B154-3D1823FADCA6}"/>
+                  </a:ext>
+                </a:extLst>
+              </p:cNvPr>
+              <p:cNvCxnSpPr>
+                <a:cxnSpLocks/>
+              </p:cNvCxnSpPr>
+              <p:nvPr/>
+            </p:nvCxnSpPr>
+            <p:spPr>
+              <a:xfrm>
+                <a:off x="4171845" y="1741275"/>
+                <a:ext cx="0" cy="1233801"/>
+              </a:xfrm>
+              <a:prstGeom prst="straightConnector1">
+                <a:avLst/>
+              </a:prstGeom>
+              <a:ln w="57150">
+                <a:solidFill>
+                  <a:srgbClr val="FF0000"/>
+                </a:solidFill>
+                <a:prstDash val="solid"/>
+                <a:tailEnd type="triangle"/>
+              </a:ln>
+            </p:spPr>
+            <p:style>
+              <a:lnRef idx="1">
+                <a:schemeClr val="accent1"/>
+              </a:lnRef>
+              <a:fillRef idx="0">
+                <a:schemeClr val="accent1"/>
+              </a:fillRef>
+              <a:effectRef idx="0">
+                <a:schemeClr val="accent1"/>
+              </a:effectRef>
+              <a:fontRef idx="minor">
+                <a:schemeClr val="tx1"/>
+              </a:fontRef>
+            </p:style>
+          </p:cxnSp>
+          <p:cxnSp>
+            <p:nvCxnSpPr>
+              <p:cNvPr id="109" name="Straight Arrow Connector 108">
+                <a:extLst>
+                  <a:ext uri="{FF2B5EF4-FFF2-40B4-BE49-F238E27FC236}">
+                    <a16:creationId xmlns:a16="http://schemas.microsoft.com/office/drawing/2014/main" id="{DB83427F-427C-5483-A034-44F735C8BB5E}"/>
+                  </a:ext>
+                </a:extLst>
+              </p:cNvPr>
+              <p:cNvCxnSpPr>
+                <a:cxnSpLocks/>
+              </p:cNvCxnSpPr>
+              <p:nvPr/>
+            </p:nvCxnSpPr>
+            <p:spPr>
+              <a:xfrm>
+                <a:off x="4172154" y="2890816"/>
+                <a:ext cx="0" cy="1149543"/>
+              </a:xfrm>
+              <a:prstGeom prst="straightConnector1">
+                <a:avLst/>
+              </a:prstGeom>
+              <a:ln w="57150">
+                <a:solidFill>
+                  <a:srgbClr val="FF0000"/>
+                </a:solidFill>
+                <a:prstDash val="solid"/>
+                <a:tailEnd type="none"/>
+              </a:ln>
+            </p:spPr>
+            <p:style>
+              <a:lnRef idx="1">
+                <a:schemeClr val="accent1"/>
+              </a:lnRef>
+              <a:fillRef idx="0">
+                <a:schemeClr val="accent1"/>
+              </a:fillRef>
+              <a:effectRef idx="0">
+                <a:schemeClr val="accent1"/>
+              </a:effectRef>
+              <a:fontRef idx="minor">
+                <a:schemeClr val="tx1"/>
+              </a:fontRef>
+            </p:style>
+          </p:cxnSp>
+        </p:grpSp>
+        <p:grpSp>
+          <p:nvGrpSpPr>
+            <p:cNvPr id="110" name="Group 109">
+              <a:extLst>
+                <a:ext uri="{FF2B5EF4-FFF2-40B4-BE49-F238E27FC236}">
+                  <a16:creationId xmlns:a16="http://schemas.microsoft.com/office/drawing/2014/main" id="{687820DA-36FB-0321-1E68-04D3B60F07CA}"/>
+                </a:ext>
+              </a:extLst>
+            </p:cNvPr>
+            <p:cNvGrpSpPr/>
+            <p:nvPr/>
+          </p:nvGrpSpPr>
+          <p:grpSpPr>
+            <a:xfrm rot="5400000">
+              <a:off x="5197348" y="649381"/>
+              <a:ext cx="309" cy="2299084"/>
+              <a:chOff x="4171845" y="1741275"/>
+              <a:chExt cx="309" cy="2299084"/>
+            </a:xfrm>
+          </p:grpSpPr>
+          <p:cxnSp>
+            <p:nvCxnSpPr>
+              <p:cNvPr id="111" name="Straight Arrow Connector 110">
+                <a:extLst>
+                  <a:ext uri="{FF2B5EF4-FFF2-40B4-BE49-F238E27FC236}">
+                    <a16:creationId xmlns:a16="http://schemas.microsoft.com/office/drawing/2014/main" id="{3F0B1485-7B18-220B-C9EB-D11719425975}"/>
+                  </a:ext>
+                </a:extLst>
+              </p:cNvPr>
+              <p:cNvCxnSpPr>
+                <a:cxnSpLocks/>
+              </p:cNvCxnSpPr>
+              <p:nvPr/>
+            </p:nvCxnSpPr>
+            <p:spPr>
+              <a:xfrm>
+                <a:off x="4171845" y="1741275"/>
+                <a:ext cx="0" cy="1233801"/>
+              </a:xfrm>
+              <a:prstGeom prst="straightConnector1">
+                <a:avLst/>
+              </a:prstGeom>
+              <a:ln w="57150">
+                <a:solidFill>
+                  <a:srgbClr val="FF0000"/>
+                </a:solidFill>
+                <a:prstDash val="solid"/>
+                <a:tailEnd type="triangle"/>
+              </a:ln>
+            </p:spPr>
+            <p:style>
+              <a:lnRef idx="1">
+                <a:schemeClr val="accent1"/>
+              </a:lnRef>
+              <a:fillRef idx="0">
+                <a:schemeClr val="accent1"/>
+              </a:fillRef>
+              <a:effectRef idx="0">
+                <a:schemeClr val="accent1"/>
+              </a:effectRef>
+              <a:fontRef idx="minor">
+                <a:schemeClr val="tx1"/>
+              </a:fontRef>
+            </p:style>
+          </p:cxnSp>
+          <p:cxnSp>
+            <p:nvCxnSpPr>
+              <p:cNvPr id="112" name="Straight Arrow Connector 111">
+                <a:extLst>
+                  <a:ext uri="{FF2B5EF4-FFF2-40B4-BE49-F238E27FC236}">
+                    <a16:creationId xmlns:a16="http://schemas.microsoft.com/office/drawing/2014/main" id="{8FAB7C38-7827-73FB-CC61-473C28E5E5A7}"/>
+                  </a:ext>
+                </a:extLst>
+              </p:cNvPr>
+              <p:cNvCxnSpPr>
+                <a:cxnSpLocks/>
+              </p:cNvCxnSpPr>
+              <p:nvPr/>
+            </p:nvCxnSpPr>
+            <p:spPr>
+              <a:xfrm>
+                <a:off x="4172154" y="2890816"/>
+                <a:ext cx="0" cy="1149543"/>
+              </a:xfrm>
+              <a:prstGeom prst="straightConnector1">
+                <a:avLst/>
+              </a:prstGeom>
+              <a:ln w="57150">
+                <a:solidFill>
+                  <a:srgbClr val="FF0000"/>
+                </a:solidFill>
+                <a:prstDash val="solid"/>
+                <a:tailEnd type="none"/>
+              </a:ln>
+            </p:spPr>
+            <p:style>
+              <a:lnRef idx="1">
+                <a:schemeClr val="accent1"/>
+              </a:lnRef>
+              <a:fillRef idx="0">
+                <a:schemeClr val="accent1"/>
+              </a:fillRef>
+              <a:effectRef idx="0">
+                <a:schemeClr val="accent1"/>
+              </a:effectRef>
+              <a:fontRef idx="minor">
+                <a:schemeClr val="tx1"/>
+              </a:fontRef>
+            </p:style>
+          </p:cxnSp>
+        </p:grpSp>
+      </p:grpSp>
+      <p:grpSp>
+        <p:nvGrpSpPr>
+          <p:cNvPr id="115" name="Group 114">
+            <a:extLst>
+              <a:ext uri="{FF2B5EF4-FFF2-40B4-BE49-F238E27FC236}">
+                <a16:creationId xmlns:a16="http://schemas.microsoft.com/office/drawing/2014/main" id="{FF893618-333B-269C-563D-574B515AA4B0}"/>
+              </a:ext>
+            </a:extLst>
+          </p:cNvPr>
+          <p:cNvGrpSpPr/>
+          <p:nvPr/>
+        </p:nvGrpSpPr>
+        <p:grpSpPr>
+          <a:xfrm rot="16200000">
+            <a:off x="4921761" y="3257431"/>
+            <a:ext cx="8976" cy="696984"/>
+            <a:chOff x="6137987" y="1723795"/>
+            <a:chExt cx="8976" cy="696984"/>
+          </a:xfrm>
+        </p:grpSpPr>
+        <p:cxnSp>
+          <p:nvCxnSpPr>
+            <p:cNvPr id="116" name="Straight Arrow Connector 115">
+              <a:extLst>
+                <a:ext uri="{FF2B5EF4-FFF2-40B4-BE49-F238E27FC236}">
+                  <a16:creationId xmlns:a16="http://schemas.microsoft.com/office/drawing/2014/main" id="{6BDFAEF0-54F9-70F9-F320-8E0C72E69A10}"/>
+                </a:ext>
+              </a:extLst>
+            </p:cNvPr>
+            <p:cNvCxnSpPr>
+              <a:cxnSpLocks/>
+            </p:cNvCxnSpPr>
+            <p:nvPr/>
+          </p:nvCxnSpPr>
+          <p:spPr>
+            <a:xfrm flipV="1">
+              <a:off x="6140609" y="1969589"/>
+              <a:ext cx="0" cy="434317"/>
+            </a:xfrm>
+            <a:prstGeom prst="straightConnector1">
+              <a:avLst/>
+            </a:prstGeom>
+            <a:ln w="38100">
+              <a:solidFill>
+                <a:srgbClr val="FF0000"/>
+              </a:solidFill>
+              <a:prstDash val="solid"/>
+              <a:tailEnd type="triangle"/>
+            </a:ln>
+          </p:spPr>
+          <p:style>
+            <a:lnRef idx="1">
+              <a:schemeClr val="accent1"/>
+            </a:lnRef>
+            <a:fillRef idx="0">
+              <a:schemeClr val="accent1"/>
+            </a:fillRef>
+            <a:effectRef idx="0">
+              <a:schemeClr val="accent1"/>
+            </a:effectRef>
+            <a:fontRef idx="minor">
+              <a:schemeClr val="tx1"/>
+            </a:fontRef>
+          </p:style>
+        </p:cxnSp>
+        <p:cxnSp>
+          <p:nvCxnSpPr>
+            <p:cNvPr id="117" name="Straight Arrow Connector 116">
+              <a:extLst>
+                <a:ext uri="{FF2B5EF4-FFF2-40B4-BE49-F238E27FC236}">
+                  <a16:creationId xmlns:a16="http://schemas.microsoft.com/office/drawing/2014/main" id="{8013DD25-8A57-AF51-A623-F7C51A87367D}"/>
+                </a:ext>
+              </a:extLst>
+            </p:cNvPr>
+            <p:cNvCxnSpPr>
+              <a:cxnSpLocks/>
+            </p:cNvCxnSpPr>
+            <p:nvPr/>
+          </p:nvCxnSpPr>
+          <p:spPr>
+            <a:xfrm flipH="1" flipV="1">
+              <a:off x="6137987" y="1723795"/>
+              <a:ext cx="8976" cy="696984"/>
+            </a:xfrm>
+            <a:prstGeom prst="straightConnector1">
+              <a:avLst/>
+            </a:prstGeom>
             <a:ln w="38100">
               <a:solidFill>
                 <a:srgbClr val="FF0000"/>
@@ -16056,36 +16590,1235 @@
           </p:style>
         </p:cxnSp>
       </p:grpSp>
-      <p:pic>
-        <p:nvPicPr>
-          <p:cNvPr id="65" name="Picture 64">
+      <p:sp>
+        <p:nvSpPr>
+          <p:cNvPr id="69" name="Rectangle 68">
             <a:extLst>
               <a:ext uri="{FF2B5EF4-FFF2-40B4-BE49-F238E27FC236}">
-                <a16:creationId xmlns:a16="http://schemas.microsoft.com/office/drawing/2014/main" id="{3356E3DA-1DD0-4FCD-2697-91D1755A9CF5}"/>
+                <a16:creationId xmlns:a16="http://schemas.microsoft.com/office/drawing/2014/main" id="{4A8CE5EE-DA6E-469F-7341-DE3EACEFB82B}"/>
               </a:ext>
             </a:extLst>
           </p:cNvPr>
-          <p:cNvPicPr>
-            <a:picLocks noChangeAspect="1"/>
-          </p:cNvPicPr>
+          <p:cNvSpPr/>
           <p:nvPr/>
-        </p:nvPicPr>
-        <p:blipFill>
-          <a:blip r:embed="rId2"/>
-          <a:stretch>
-            <a:fillRect/>
-          </a:stretch>
-        </p:blipFill>
+        </p:nvSpPr>
         <p:spPr>
-          <a:xfrm>
-            <a:off x="7429448" y="1836877"/>
-            <a:ext cx="3811122" cy="3255496"/>
+          <a:xfrm rot="5400000">
+            <a:off x="4622467" y="3572074"/>
+            <a:ext cx="1276158" cy="122382"/>
           </a:xfrm>
           <a:prstGeom prst="rect">
             <a:avLst/>
           </a:prstGeom>
+          <a:solidFill>
+            <a:schemeClr val="bg2">
+              <a:lumMod val="50000"/>
+            </a:schemeClr>
+          </a:solidFill>
+          <a:ln>
+            <a:solidFill>
+              <a:schemeClr val="tx1"/>
+            </a:solidFill>
+          </a:ln>
         </p:spPr>
-      </p:pic>
+        <p:style>
+          <a:lnRef idx="2">
+            <a:schemeClr val="accent1">
+              <a:shade val="50000"/>
+            </a:schemeClr>
+          </a:lnRef>
+          <a:fillRef idx="1">
+            <a:schemeClr val="accent1"/>
+          </a:fillRef>
+          <a:effectRef idx="0">
+            <a:schemeClr val="accent1"/>
+          </a:effectRef>
+          <a:fontRef idx="minor">
+            <a:schemeClr val="lt1"/>
+          </a:fontRef>
+        </p:style>
+        <p:txBody>
+          <a:bodyPr rtlCol="0" anchor="ctr"/>
+          <a:lstStyle/>
+          <a:p>
+            <a:pPr algn="ctr"/>
+            <a:endParaRPr lang="en-US"/>
+          </a:p>
+        </p:txBody>
+      </p:sp>
+      <p:grpSp>
+        <p:nvGrpSpPr>
+          <p:cNvPr id="126" name="Group 125">
+            <a:extLst>
+              <a:ext uri="{FF2B5EF4-FFF2-40B4-BE49-F238E27FC236}">
+                <a16:creationId xmlns:a16="http://schemas.microsoft.com/office/drawing/2014/main" id="{A446E0D2-41AD-75C8-8814-C45DC15F7457}"/>
+              </a:ext>
+            </a:extLst>
+          </p:cNvPr>
+          <p:cNvGrpSpPr/>
+          <p:nvPr/>
+        </p:nvGrpSpPr>
+        <p:grpSpPr>
+          <a:xfrm>
+            <a:off x="4390304" y="2944819"/>
+            <a:ext cx="8976" cy="696984"/>
+            <a:chOff x="6137987" y="1723795"/>
+            <a:chExt cx="8976" cy="696984"/>
+          </a:xfrm>
+        </p:grpSpPr>
+        <p:cxnSp>
+          <p:nvCxnSpPr>
+            <p:cNvPr id="127" name="Straight Arrow Connector 126">
+              <a:extLst>
+                <a:ext uri="{FF2B5EF4-FFF2-40B4-BE49-F238E27FC236}">
+                  <a16:creationId xmlns:a16="http://schemas.microsoft.com/office/drawing/2014/main" id="{207A1643-60CC-56FE-2D40-1200792CB29A}"/>
+                </a:ext>
+              </a:extLst>
+            </p:cNvPr>
+            <p:cNvCxnSpPr>
+              <a:cxnSpLocks/>
+            </p:cNvCxnSpPr>
+            <p:nvPr/>
+          </p:nvCxnSpPr>
+          <p:spPr>
+            <a:xfrm flipV="1">
+              <a:off x="6140609" y="1969589"/>
+              <a:ext cx="0" cy="434317"/>
+            </a:xfrm>
+            <a:prstGeom prst="straightConnector1">
+              <a:avLst/>
+            </a:prstGeom>
+            <a:ln w="38100">
+              <a:solidFill>
+                <a:srgbClr val="FF0000"/>
+              </a:solidFill>
+              <a:prstDash val="solid"/>
+              <a:tailEnd type="triangle"/>
+            </a:ln>
+          </p:spPr>
+          <p:style>
+            <a:lnRef idx="1">
+              <a:schemeClr val="accent1"/>
+            </a:lnRef>
+            <a:fillRef idx="0">
+              <a:schemeClr val="accent1"/>
+            </a:fillRef>
+            <a:effectRef idx="0">
+              <a:schemeClr val="accent1"/>
+            </a:effectRef>
+            <a:fontRef idx="minor">
+              <a:schemeClr val="tx1"/>
+            </a:fontRef>
+          </p:style>
+        </p:cxnSp>
+        <p:cxnSp>
+          <p:nvCxnSpPr>
+            <p:cNvPr id="128" name="Straight Arrow Connector 127">
+              <a:extLst>
+                <a:ext uri="{FF2B5EF4-FFF2-40B4-BE49-F238E27FC236}">
+                  <a16:creationId xmlns:a16="http://schemas.microsoft.com/office/drawing/2014/main" id="{850282B6-679F-3059-7F02-90F946354285}"/>
+                </a:ext>
+              </a:extLst>
+            </p:cNvPr>
+            <p:cNvCxnSpPr>
+              <a:cxnSpLocks/>
+            </p:cNvCxnSpPr>
+            <p:nvPr/>
+          </p:nvCxnSpPr>
+          <p:spPr>
+            <a:xfrm flipH="1" flipV="1">
+              <a:off x="6137987" y="1723795"/>
+              <a:ext cx="8976" cy="696984"/>
+            </a:xfrm>
+            <a:prstGeom prst="straightConnector1">
+              <a:avLst/>
+            </a:prstGeom>
+            <a:ln w="38100">
+              <a:solidFill>
+                <a:srgbClr val="FF0000"/>
+              </a:solidFill>
+              <a:prstDash val="solid"/>
+              <a:tailEnd type="none"/>
+            </a:ln>
+          </p:spPr>
+          <p:style>
+            <a:lnRef idx="1">
+              <a:schemeClr val="accent1"/>
+            </a:lnRef>
+            <a:fillRef idx="0">
+              <a:schemeClr val="accent1"/>
+            </a:fillRef>
+            <a:effectRef idx="0">
+              <a:schemeClr val="accent1"/>
+            </a:effectRef>
+            <a:fontRef idx="minor">
+              <a:schemeClr val="tx1"/>
+            </a:fontRef>
+          </p:style>
+        </p:cxnSp>
+      </p:grpSp>
+      <p:grpSp>
+        <p:nvGrpSpPr>
+          <p:cNvPr id="129" name="Group 128">
+            <a:extLst>
+              <a:ext uri="{FF2B5EF4-FFF2-40B4-BE49-F238E27FC236}">
+                <a16:creationId xmlns:a16="http://schemas.microsoft.com/office/drawing/2014/main" id="{1BE7BBDF-D0A5-1889-63C7-2AB79553C8F0}"/>
+              </a:ext>
+            </a:extLst>
+          </p:cNvPr>
+          <p:cNvGrpSpPr/>
+          <p:nvPr/>
+        </p:nvGrpSpPr>
+        <p:grpSpPr>
+          <a:xfrm rot="10800000">
+            <a:off x="4470105" y="2858183"/>
+            <a:ext cx="8976" cy="696984"/>
+            <a:chOff x="6137987" y="1723795"/>
+            <a:chExt cx="8976" cy="696984"/>
+          </a:xfrm>
+        </p:grpSpPr>
+        <p:cxnSp>
+          <p:nvCxnSpPr>
+            <p:cNvPr id="130" name="Straight Arrow Connector 129">
+              <a:extLst>
+                <a:ext uri="{FF2B5EF4-FFF2-40B4-BE49-F238E27FC236}">
+                  <a16:creationId xmlns:a16="http://schemas.microsoft.com/office/drawing/2014/main" id="{2909D022-786F-31FF-1DCC-418F85A0B75B}"/>
+                </a:ext>
+              </a:extLst>
+            </p:cNvPr>
+            <p:cNvCxnSpPr>
+              <a:cxnSpLocks/>
+            </p:cNvCxnSpPr>
+            <p:nvPr/>
+          </p:nvCxnSpPr>
+          <p:spPr>
+            <a:xfrm flipV="1">
+              <a:off x="6140609" y="1969589"/>
+              <a:ext cx="0" cy="434317"/>
+            </a:xfrm>
+            <a:prstGeom prst="straightConnector1">
+              <a:avLst/>
+            </a:prstGeom>
+            <a:ln w="38100">
+              <a:solidFill>
+                <a:srgbClr val="FF0000"/>
+              </a:solidFill>
+              <a:prstDash val="solid"/>
+              <a:tailEnd type="triangle"/>
+            </a:ln>
+          </p:spPr>
+          <p:style>
+            <a:lnRef idx="1">
+              <a:schemeClr val="accent1"/>
+            </a:lnRef>
+            <a:fillRef idx="0">
+              <a:schemeClr val="accent1"/>
+            </a:fillRef>
+            <a:effectRef idx="0">
+              <a:schemeClr val="accent1"/>
+            </a:effectRef>
+            <a:fontRef idx="minor">
+              <a:schemeClr val="tx1"/>
+            </a:fontRef>
+          </p:style>
+        </p:cxnSp>
+        <p:cxnSp>
+          <p:nvCxnSpPr>
+            <p:cNvPr id="131" name="Straight Arrow Connector 130">
+              <a:extLst>
+                <a:ext uri="{FF2B5EF4-FFF2-40B4-BE49-F238E27FC236}">
+                  <a16:creationId xmlns:a16="http://schemas.microsoft.com/office/drawing/2014/main" id="{9B99F83E-AD65-26BF-0C3F-AD5DF5350052}"/>
+                </a:ext>
+              </a:extLst>
+            </p:cNvPr>
+            <p:cNvCxnSpPr>
+              <a:cxnSpLocks/>
+            </p:cNvCxnSpPr>
+            <p:nvPr/>
+          </p:nvCxnSpPr>
+          <p:spPr>
+            <a:xfrm flipH="1" flipV="1">
+              <a:off x="6137987" y="1723795"/>
+              <a:ext cx="8976" cy="696984"/>
+            </a:xfrm>
+            <a:prstGeom prst="straightConnector1">
+              <a:avLst/>
+            </a:prstGeom>
+            <a:ln w="38100">
+              <a:solidFill>
+                <a:srgbClr val="FF0000"/>
+              </a:solidFill>
+              <a:prstDash val="solid"/>
+              <a:tailEnd type="none"/>
+            </a:ln>
+          </p:spPr>
+          <p:style>
+            <a:lnRef idx="1">
+              <a:schemeClr val="accent1"/>
+            </a:lnRef>
+            <a:fillRef idx="0">
+              <a:schemeClr val="accent1"/>
+            </a:fillRef>
+            <a:effectRef idx="0">
+              <a:schemeClr val="accent1"/>
+            </a:effectRef>
+            <a:fontRef idx="minor">
+              <a:schemeClr val="tx1"/>
+            </a:fontRef>
+          </p:style>
+        </p:cxnSp>
+      </p:grpSp>
+      <p:sp>
+        <p:nvSpPr>
+          <p:cNvPr id="60" name="Rectangle 59">
+            <a:extLst>
+              <a:ext uri="{FF2B5EF4-FFF2-40B4-BE49-F238E27FC236}">
+                <a16:creationId xmlns:a16="http://schemas.microsoft.com/office/drawing/2014/main" id="{BD71FFE5-FD45-FF59-3DB5-731DDCF7BD63}"/>
+              </a:ext>
+            </a:extLst>
+          </p:cNvPr>
+          <p:cNvSpPr/>
+          <p:nvPr/>
+        </p:nvSpPr>
+        <p:spPr>
+          <a:xfrm>
+            <a:off x="3784419" y="2822437"/>
+            <a:ext cx="1276158" cy="122382"/>
+          </a:xfrm>
+          <a:prstGeom prst="rect">
+            <a:avLst/>
+          </a:prstGeom>
+          <a:solidFill>
+            <a:schemeClr val="bg2">
+              <a:lumMod val="50000"/>
+            </a:schemeClr>
+          </a:solidFill>
+          <a:ln>
+            <a:solidFill>
+              <a:schemeClr val="tx1"/>
+            </a:solidFill>
+          </a:ln>
+        </p:spPr>
+        <p:style>
+          <a:lnRef idx="2">
+            <a:schemeClr val="accent1">
+              <a:shade val="50000"/>
+            </a:schemeClr>
+          </a:lnRef>
+          <a:fillRef idx="1">
+            <a:schemeClr val="accent1"/>
+          </a:fillRef>
+          <a:effectRef idx="0">
+            <a:schemeClr val="accent1"/>
+          </a:effectRef>
+          <a:fontRef idx="minor">
+            <a:schemeClr val="lt1"/>
+          </a:fontRef>
+        </p:style>
+        <p:txBody>
+          <a:bodyPr rtlCol="0" anchor="ctr"/>
+          <a:lstStyle/>
+          <a:p>
+            <a:pPr algn="ctr"/>
+            <a:endParaRPr lang="en-US"/>
+          </a:p>
+        </p:txBody>
+      </p:sp>
+      <p:grpSp>
+        <p:nvGrpSpPr>
+          <p:cNvPr id="173" name="Group 172">
+            <a:extLst>
+              <a:ext uri="{FF2B5EF4-FFF2-40B4-BE49-F238E27FC236}">
+                <a16:creationId xmlns:a16="http://schemas.microsoft.com/office/drawing/2014/main" id="{3C65D196-9558-C982-2EE1-39D61E1BFFFA}"/>
+              </a:ext>
+            </a:extLst>
+          </p:cNvPr>
+          <p:cNvGrpSpPr/>
+          <p:nvPr/>
+        </p:nvGrpSpPr>
+        <p:grpSpPr>
+          <a:xfrm rot="5400000">
+            <a:off x="4056333" y="3293898"/>
+            <a:ext cx="8976" cy="696984"/>
+            <a:chOff x="6137987" y="1723795"/>
+            <a:chExt cx="8976" cy="696984"/>
+          </a:xfrm>
+        </p:grpSpPr>
+        <p:cxnSp>
+          <p:nvCxnSpPr>
+            <p:cNvPr id="175" name="Straight Arrow Connector 174">
+              <a:extLst>
+                <a:ext uri="{FF2B5EF4-FFF2-40B4-BE49-F238E27FC236}">
+                  <a16:creationId xmlns:a16="http://schemas.microsoft.com/office/drawing/2014/main" id="{D92B15D1-6A08-59E9-1222-DB7C3C8767DF}"/>
+                </a:ext>
+              </a:extLst>
+            </p:cNvPr>
+            <p:cNvCxnSpPr>
+              <a:cxnSpLocks/>
+            </p:cNvCxnSpPr>
+            <p:nvPr/>
+          </p:nvCxnSpPr>
+          <p:spPr>
+            <a:xfrm flipV="1">
+              <a:off x="6140609" y="1969589"/>
+              <a:ext cx="0" cy="434317"/>
+            </a:xfrm>
+            <a:prstGeom prst="straightConnector1">
+              <a:avLst/>
+            </a:prstGeom>
+            <a:ln w="38100">
+              <a:solidFill>
+                <a:srgbClr val="FF0000"/>
+              </a:solidFill>
+              <a:prstDash val="solid"/>
+              <a:tailEnd type="triangle"/>
+            </a:ln>
+          </p:spPr>
+          <p:style>
+            <a:lnRef idx="1">
+              <a:schemeClr val="accent1"/>
+            </a:lnRef>
+            <a:fillRef idx="0">
+              <a:schemeClr val="accent1"/>
+            </a:fillRef>
+            <a:effectRef idx="0">
+              <a:schemeClr val="accent1"/>
+            </a:effectRef>
+            <a:fontRef idx="minor">
+              <a:schemeClr val="tx1"/>
+            </a:fontRef>
+          </p:style>
+        </p:cxnSp>
+        <p:cxnSp>
+          <p:nvCxnSpPr>
+            <p:cNvPr id="176" name="Straight Arrow Connector 175">
+              <a:extLst>
+                <a:ext uri="{FF2B5EF4-FFF2-40B4-BE49-F238E27FC236}">
+                  <a16:creationId xmlns:a16="http://schemas.microsoft.com/office/drawing/2014/main" id="{DC00861B-EC0A-9CB2-0B44-36CF9BD2F351}"/>
+                </a:ext>
+              </a:extLst>
+            </p:cNvPr>
+            <p:cNvCxnSpPr>
+              <a:cxnSpLocks/>
+            </p:cNvCxnSpPr>
+            <p:nvPr/>
+          </p:nvCxnSpPr>
+          <p:spPr>
+            <a:xfrm flipH="1" flipV="1">
+              <a:off x="6137987" y="1723795"/>
+              <a:ext cx="8976" cy="696984"/>
+            </a:xfrm>
+            <a:prstGeom prst="straightConnector1">
+              <a:avLst/>
+            </a:prstGeom>
+            <a:ln w="38100">
+              <a:solidFill>
+                <a:srgbClr val="FF0000"/>
+              </a:solidFill>
+              <a:prstDash val="solid"/>
+              <a:tailEnd type="none"/>
+            </a:ln>
+          </p:spPr>
+          <p:style>
+            <a:lnRef idx="1">
+              <a:schemeClr val="accent1"/>
+            </a:lnRef>
+            <a:fillRef idx="0">
+              <a:schemeClr val="accent1"/>
+            </a:fillRef>
+            <a:effectRef idx="0">
+              <a:schemeClr val="accent1"/>
+            </a:effectRef>
+            <a:fontRef idx="minor">
+              <a:schemeClr val="tx1"/>
+            </a:fontRef>
+          </p:style>
+        </p:cxnSp>
+      </p:grpSp>
+      <p:grpSp>
+        <p:nvGrpSpPr>
+          <p:cNvPr id="180" name="Group 179">
+            <a:extLst>
+              <a:ext uri="{FF2B5EF4-FFF2-40B4-BE49-F238E27FC236}">
+                <a16:creationId xmlns:a16="http://schemas.microsoft.com/office/drawing/2014/main" id="{E495170C-D7F6-8002-6091-A551AE105588}"/>
+              </a:ext>
+            </a:extLst>
+          </p:cNvPr>
+          <p:cNvGrpSpPr/>
+          <p:nvPr/>
+        </p:nvGrpSpPr>
+        <p:grpSpPr>
+          <a:xfrm rot="5400000">
+            <a:off x="3331432" y="3261228"/>
+            <a:ext cx="8976" cy="696984"/>
+            <a:chOff x="6137987" y="1723795"/>
+            <a:chExt cx="8976" cy="696984"/>
+          </a:xfrm>
+        </p:grpSpPr>
+        <p:cxnSp>
+          <p:nvCxnSpPr>
+            <p:cNvPr id="183" name="Straight Arrow Connector 182">
+              <a:extLst>
+                <a:ext uri="{FF2B5EF4-FFF2-40B4-BE49-F238E27FC236}">
+                  <a16:creationId xmlns:a16="http://schemas.microsoft.com/office/drawing/2014/main" id="{55844877-29B5-E614-D489-00174F312C9F}"/>
+                </a:ext>
+              </a:extLst>
+            </p:cNvPr>
+            <p:cNvCxnSpPr>
+              <a:cxnSpLocks/>
+            </p:cNvCxnSpPr>
+            <p:nvPr/>
+          </p:nvCxnSpPr>
+          <p:spPr>
+            <a:xfrm flipV="1">
+              <a:off x="6140609" y="1969589"/>
+              <a:ext cx="0" cy="434317"/>
+            </a:xfrm>
+            <a:prstGeom prst="straightConnector1">
+              <a:avLst/>
+            </a:prstGeom>
+            <a:ln w="38100">
+              <a:solidFill>
+                <a:srgbClr val="FF0000"/>
+              </a:solidFill>
+              <a:prstDash val="solid"/>
+              <a:tailEnd type="triangle"/>
+            </a:ln>
+          </p:spPr>
+          <p:style>
+            <a:lnRef idx="1">
+              <a:schemeClr val="accent1"/>
+            </a:lnRef>
+            <a:fillRef idx="0">
+              <a:schemeClr val="accent1"/>
+            </a:fillRef>
+            <a:effectRef idx="0">
+              <a:schemeClr val="accent1"/>
+            </a:effectRef>
+            <a:fontRef idx="minor">
+              <a:schemeClr val="tx1"/>
+            </a:fontRef>
+          </p:style>
+        </p:cxnSp>
+        <p:cxnSp>
+          <p:nvCxnSpPr>
+            <p:cNvPr id="184" name="Straight Arrow Connector 183">
+              <a:extLst>
+                <a:ext uri="{FF2B5EF4-FFF2-40B4-BE49-F238E27FC236}">
+                  <a16:creationId xmlns:a16="http://schemas.microsoft.com/office/drawing/2014/main" id="{445F9FE8-520D-B311-C353-46D29AEBA84F}"/>
+                </a:ext>
+              </a:extLst>
+            </p:cNvPr>
+            <p:cNvCxnSpPr>
+              <a:cxnSpLocks/>
+            </p:cNvCxnSpPr>
+            <p:nvPr/>
+          </p:nvCxnSpPr>
+          <p:spPr>
+            <a:xfrm flipH="1" flipV="1">
+              <a:off x="6137987" y="1723795"/>
+              <a:ext cx="8976" cy="696984"/>
+            </a:xfrm>
+            <a:prstGeom prst="straightConnector1">
+              <a:avLst/>
+            </a:prstGeom>
+            <a:ln w="38100">
+              <a:solidFill>
+                <a:srgbClr val="FF0000"/>
+              </a:solidFill>
+              <a:prstDash val="solid"/>
+              <a:tailEnd type="none"/>
+            </a:ln>
+          </p:spPr>
+          <p:style>
+            <a:lnRef idx="1">
+              <a:schemeClr val="accent1"/>
+            </a:lnRef>
+            <a:fillRef idx="0">
+              <a:schemeClr val="accent1"/>
+            </a:fillRef>
+            <a:effectRef idx="0">
+              <a:schemeClr val="accent1"/>
+            </a:effectRef>
+            <a:fontRef idx="minor">
+              <a:schemeClr val="tx1"/>
+            </a:fontRef>
+          </p:style>
+        </p:cxnSp>
+      </p:grpSp>
+      <p:grpSp>
+        <p:nvGrpSpPr>
+          <p:cNvPr id="185" name="Group 184">
+            <a:extLst>
+              <a:ext uri="{FF2B5EF4-FFF2-40B4-BE49-F238E27FC236}">
+                <a16:creationId xmlns:a16="http://schemas.microsoft.com/office/drawing/2014/main" id="{76ADDA5A-AF22-D44D-26A1-9694C05627CF}"/>
+              </a:ext>
+            </a:extLst>
+          </p:cNvPr>
+          <p:cNvGrpSpPr/>
+          <p:nvPr/>
+        </p:nvGrpSpPr>
+        <p:grpSpPr>
+          <a:xfrm rot="16200000">
+            <a:off x="4107748" y="3202709"/>
+            <a:ext cx="8976" cy="696984"/>
+            <a:chOff x="6137987" y="1723795"/>
+            <a:chExt cx="8976" cy="696984"/>
+          </a:xfrm>
+        </p:grpSpPr>
+        <p:cxnSp>
+          <p:nvCxnSpPr>
+            <p:cNvPr id="186" name="Straight Arrow Connector 185">
+              <a:extLst>
+                <a:ext uri="{FF2B5EF4-FFF2-40B4-BE49-F238E27FC236}">
+                  <a16:creationId xmlns:a16="http://schemas.microsoft.com/office/drawing/2014/main" id="{B076BFFA-72E6-6119-CB84-7532F2A8746C}"/>
+                </a:ext>
+              </a:extLst>
+            </p:cNvPr>
+            <p:cNvCxnSpPr>
+              <a:cxnSpLocks/>
+            </p:cNvCxnSpPr>
+            <p:nvPr/>
+          </p:nvCxnSpPr>
+          <p:spPr>
+            <a:xfrm flipV="1">
+              <a:off x="6140609" y="1969589"/>
+              <a:ext cx="0" cy="434317"/>
+            </a:xfrm>
+            <a:prstGeom prst="straightConnector1">
+              <a:avLst/>
+            </a:prstGeom>
+            <a:ln w="38100">
+              <a:solidFill>
+                <a:srgbClr val="FF0000"/>
+              </a:solidFill>
+              <a:prstDash val="solid"/>
+              <a:tailEnd type="triangle"/>
+            </a:ln>
+          </p:spPr>
+          <p:style>
+            <a:lnRef idx="1">
+              <a:schemeClr val="accent1"/>
+            </a:lnRef>
+            <a:fillRef idx="0">
+              <a:schemeClr val="accent1"/>
+            </a:fillRef>
+            <a:effectRef idx="0">
+              <a:schemeClr val="accent1"/>
+            </a:effectRef>
+            <a:fontRef idx="minor">
+              <a:schemeClr val="tx1"/>
+            </a:fontRef>
+          </p:style>
+        </p:cxnSp>
+        <p:cxnSp>
+          <p:nvCxnSpPr>
+            <p:cNvPr id="187" name="Straight Arrow Connector 186">
+              <a:extLst>
+                <a:ext uri="{FF2B5EF4-FFF2-40B4-BE49-F238E27FC236}">
+                  <a16:creationId xmlns:a16="http://schemas.microsoft.com/office/drawing/2014/main" id="{49FF9871-FB79-6CD6-AC9D-91920F586921}"/>
+                </a:ext>
+              </a:extLst>
+            </p:cNvPr>
+            <p:cNvCxnSpPr>
+              <a:cxnSpLocks/>
+            </p:cNvCxnSpPr>
+            <p:nvPr/>
+          </p:nvCxnSpPr>
+          <p:spPr>
+            <a:xfrm flipH="1" flipV="1">
+              <a:off x="6137987" y="1723795"/>
+              <a:ext cx="8976" cy="696984"/>
+            </a:xfrm>
+            <a:prstGeom prst="straightConnector1">
+              <a:avLst/>
+            </a:prstGeom>
+            <a:ln w="38100">
+              <a:solidFill>
+                <a:srgbClr val="FF0000"/>
+              </a:solidFill>
+              <a:prstDash val="solid"/>
+              <a:tailEnd type="none"/>
+            </a:ln>
+          </p:spPr>
+          <p:style>
+            <a:lnRef idx="1">
+              <a:schemeClr val="accent1"/>
+            </a:lnRef>
+            <a:fillRef idx="0">
+              <a:schemeClr val="accent1"/>
+            </a:fillRef>
+            <a:effectRef idx="0">
+              <a:schemeClr val="accent1"/>
+            </a:effectRef>
+            <a:fontRef idx="minor">
+              <a:schemeClr val="tx1"/>
+            </a:fontRef>
+          </p:style>
+        </p:cxnSp>
+      </p:grpSp>
+      <p:sp>
+        <p:nvSpPr>
+          <p:cNvPr id="132" name="Rectangle 131">
+            <a:extLst>
+              <a:ext uri="{FF2B5EF4-FFF2-40B4-BE49-F238E27FC236}">
+                <a16:creationId xmlns:a16="http://schemas.microsoft.com/office/drawing/2014/main" id="{64C04DCE-7702-9B50-7BBE-44E346A7D2AD}"/>
+              </a:ext>
+            </a:extLst>
+          </p:cNvPr>
+          <p:cNvSpPr/>
+          <p:nvPr/>
+        </p:nvSpPr>
+        <p:spPr>
+          <a:xfrm rot="5400000">
+            <a:off x="3335435" y="3558677"/>
+            <a:ext cx="757566" cy="107351"/>
+          </a:xfrm>
+          <a:prstGeom prst="rect">
+            <a:avLst/>
+          </a:prstGeom>
+          <a:solidFill>
+            <a:schemeClr val="bg2">
+              <a:lumMod val="50000"/>
+            </a:schemeClr>
+          </a:solidFill>
+          <a:ln>
+            <a:solidFill>
+              <a:schemeClr val="tx1"/>
+            </a:solidFill>
+          </a:ln>
+        </p:spPr>
+        <p:style>
+          <a:lnRef idx="2">
+            <a:schemeClr val="accent1">
+              <a:shade val="50000"/>
+            </a:schemeClr>
+          </a:lnRef>
+          <a:fillRef idx="1">
+            <a:schemeClr val="accent1"/>
+          </a:fillRef>
+          <a:effectRef idx="0">
+            <a:schemeClr val="accent1"/>
+          </a:effectRef>
+          <a:fontRef idx="minor">
+            <a:schemeClr val="lt1"/>
+          </a:fontRef>
+        </p:style>
+        <p:txBody>
+          <a:bodyPr rtlCol="0" anchor="ctr"/>
+          <a:lstStyle/>
+          <a:p>
+            <a:pPr algn="ctr"/>
+            <a:endParaRPr lang="en-US"/>
+          </a:p>
+        </p:txBody>
+      </p:sp>
+      <p:sp>
+        <p:nvSpPr>
+          <p:cNvPr id="55" name="Rectangle 54">
+            <a:extLst>
+              <a:ext uri="{FF2B5EF4-FFF2-40B4-BE49-F238E27FC236}">
+                <a16:creationId xmlns:a16="http://schemas.microsoft.com/office/drawing/2014/main" id="{6629B0FD-D1DD-6D01-E623-81B1E1A97B16}"/>
+              </a:ext>
+            </a:extLst>
+          </p:cNvPr>
+          <p:cNvSpPr/>
+          <p:nvPr/>
+        </p:nvSpPr>
+        <p:spPr>
+          <a:xfrm rot="18900000">
+            <a:off x="3785864" y="3623881"/>
+            <a:ext cx="1276158" cy="122382"/>
+          </a:xfrm>
+          <a:prstGeom prst="rect">
+            <a:avLst/>
+          </a:prstGeom>
+          <a:solidFill>
+            <a:schemeClr val="accent1">
+              <a:lumMod val="60000"/>
+              <a:lumOff val="40000"/>
+            </a:schemeClr>
+          </a:solidFill>
+          <a:ln>
+            <a:solidFill>
+              <a:schemeClr val="tx1"/>
+            </a:solidFill>
+          </a:ln>
+        </p:spPr>
+        <p:style>
+          <a:lnRef idx="2">
+            <a:schemeClr val="accent1">
+              <a:shade val="50000"/>
+            </a:schemeClr>
+          </a:lnRef>
+          <a:fillRef idx="1">
+            <a:schemeClr val="accent1"/>
+          </a:fillRef>
+          <a:effectRef idx="0">
+            <a:schemeClr val="accent1"/>
+          </a:effectRef>
+          <a:fontRef idx="minor">
+            <a:schemeClr val="lt1"/>
+          </a:fontRef>
+        </p:style>
+        <p:txBody>
+          <a:bodyPr rtlCol="0" anchor="ctr"/>
+          <a:lstStyle/>
+          <a:p>
+            <a:pPr algn="ctr"/>
+            <a:endParaRPr lang="en-US"/>
+          </a:p>
+        </p:txBody>
+      </p:sp>
+      <p:sp>
+        <p:nvSpPr>
+          <p:cNvPr id="194" name="Rectangle 193">
+            <a:extLst>
+              <a:ext uri="{FF2B5EF4-FFF2-40B4-BE49-F238E27FC236}">
+                <a16:creationId xmlns:a16="http://schemas.microsoft.com/office/drawing/2014/main" id="{1EAD7D23-76F3-D474-657E-6E3B3AC2C97C}"/>
+              </a:ext>
+            </a:extLst>
+          </p:cNvPr>
+          <p:cNvSpPr/>
+          <p:nvPr/>
+        </p:nvSpPr>
+        <p:spPr>
+          <a:xfrm>
+            <a:off x="4081945" y="4386474"/>
+            <a:ext cx="757566" cy="107351"/>
+          </a:xfrm>
+          <a:prstGeom prst="rect">
+            <a:avLst/>
+          </a:prstGeom>
+          <a:solidFill>
+            <a:schemeClr val="bg2">
+              <a:lumMod val="50000"/>
+            </a:schemeClr>
+          </a:solidFill>
+          <a:ln>
+            <a:solidFill>
+              <a:schemeClr val="tx1"/>
+            </a:solidFill>
+          </a:ln>
+        </p:spPr>
+        <p:style>
+          <a:lnRef idx="2">
+            <a:schemeClr val="accent1">
+              <a:shade val="50000"/>
+            </a:schemeClr>
+          </a:lnRef>
+          <a:fillRef idx="1">
+            <a:schemeClr val="accent1"/>
+          </a:fillRef>
+          <a:effectRef idx="0">
+            <a:schemeClr val="accent1"/>
+          </a:effectRef>
+          <a:fontRef idx="minor">
+            <a:schemeClr val="lt1"/>
+          </a:fontRef>
+        </p:style>
+        <p:txBody>
+          <a:bodyPr rtlCol="0" anchor="ctr"/>
+          <a:lstStyle/>
+          <a:p>
+            <a:pPr algn="ctr"/>
+            <a:endParaRPr lang="en-US"/>
+          </a:p>
+        </p:txBody>
+      </p:sp>
+      <p:grpSp>
+        <p:nvGrpSpPr>
+          <p:cNvPr id="195" name="Group 194">
+            <a:extLst>
+              <a:ext uri="{FF2B5EF4-FFF2-40B4-BE49-F238E27FC236}">
+                <a16:creationId xmlns:a16="http://schemas.microsoft.com/office/drawing/2014/main" id="{0FFBF9E6-DAF2-1ACE-6AAB-84B4C36324A8}"/>
+              </a:ext>
+            </a:extLst>
+          </p:cNvPr>
+          <p:cNvGrpSpPr/>
+          <p:nvPr/>
+        </p:nvGrpSpPr>
+        <p:grpSpPr>
+          <a:xfrm rot="10800000">
+            <a:off x="4451426" y="4493476"/>
+            <a:ext cx="8976" cy="696984"/>
+            <a:chOff x="6137987" y="1723795"/>
+            <a:chExt cx="8976" cy="696984"/>
+          </a:xfrm>
+        </p:grpSpPr>
+        <p:cxnSp>
+          <p:nvCxnSpPr>
+            <p:cNvPr id="196" name="Straight Arrow Connector 195">
+              <a:extLst>
+                <a:ext uri="{FF2B5EF4-FFF2-40B4-BE49-F238E27FC236}">
+                  <a16:creationId xmlns:a16="http://schemas.microsoft.com/office/drawing/2014/main" id="{531808CC-34CE-C240-4817-3C29654AEF86}"/>
+                </a:ext>
+              </a:extLst>
+            </p:cNvPr>
+            <p:cNvCxnSpPr>
+              <a:cxnSpLocks/>
+            </p:cNvCxnSpPr>
+            <p:nvPr/>
+          </p:nvCxnSpPr>
+          <p:spPr>
+            <a:xfrm flipV="1">
+              <a:off x="6140609" y="1969589"/>
+              <a:ext cx="0" cy="434317"/>
+            </a:xfrm>
+            <a:prstGeom prst="straightConnector1">
+              <a:avLst/>
+            </a:prstGeom>
+            <a:ln w="38100">
+              <a:solidFill>
+                <a:srgbClr val="FF0000"/>
+              </a:solidFill>
+              <a:prstDash val="solid"/>
+              <a:tailEnd type="triangle"/>
+            </a:ln>
+          </p:spPr>
+          <p:style>
+            <a:lnRef idx="1">
+              <a:schemeClr val="accent1"/>
+            </a:lnRef>
+            <a:fillRef idx="0">
+              <a:schemeClr val="accent1"/>
+            </a:fillRef>
+            <a:effectRef idx="0">
+              <a:schemeClr val="accent1"/>
+            </a:effectRef>
+            <a:fontRef idx="minor">
+              <a:schemeClr val="tx1"/>
+            </a:fontRef>
+          </p:style>
+        </p:cxnSp>
+        <p:cxnSp>
+          <p:nvCxnSpPr>
+            <p:cNvPr id="197" name="Straight Arrow Connector 196">
+              <a:extLst>
+                <a:ext uri="{FF2B5EF4-FFF2-40B4-BE49-F238E27FC236}">
+                  <a16:creationId xmlns:a16="http://schemas.microsoft.com/office/drawing/2014/main" id="{5567ACDB-93AA-2230-DDFF-EE5B33D51536}"/>
+                </a:ext>
+              </a:extLst>
+            </p:cNvPr>
+            <p:cNvCxnSpPr>
+              <a:cxnSpLocks/>
+            </p:cNvCxnSpPr>
+            <p:nvPr/>
+          </p:nvCxnSpPr>
+          <p:spPr>
+            <a:xfrm flipH="1" flipV="1">
+              <a:off x="6137987" y="1723795"/>
+              <a:ext cx="8976" cy="696984"/>
+            </a:xfrm>
+            <a:prstGeom prst="straightConnector1">
+              <a:avLst/>
+            </a:prstGeom>
+            <a:ln w="38100">
+              <a:solidFill>
+                <a:srgbClr val="FF0000"/>
+              </a:solidFill>
+              <a:prstDash val="solid"/>
+              <a:tailEnd type="none"/>
+            </a:ln>
+          </p:spPr>
+          <p:style>
+            <a:lnRef idx="1">
+              <a:schemeClr val="accent1"/>
+            </a:lnRef>
+            <a:fillRef idx="0">
+              <a:schemeClr val="accent1"/>
+            </a:fillRef>
+            <a:effectRef idx="0">
+              <a:schemeClr val="accent1"/>
+            </a:effectRef>
+            <a:fontRef idx="minor">
+              <a:schemeClr val="tx1"/>
+            </a:fontRef>
+          </p:style>
+        </p:cxnSp>
+      </p:grpSp>
+      <p:sp>
+        <p:nvSpPr>
+          <p:cNvPr id="198" name="TextBox 197">
+            <a:extLst>
+              <a:ext uri="{FF2B5EF4-FFF2-40B4-BE49-F238E27FC236}">
+                <a16:creationId xmlns:a16="http://schemas.microsoft.com/office/drawing/2014/main" id="{002466E1-710A-3252-CE56-0580496E2F7D}"/>
+              </a:ext>
+            </a:extLst>
+          </p:cNvPr>
+          <p:cNvSpPr txBox="1"/>
+          <p:nvPr/>
+        </p:nvSpPr>
+        <p:spPr>
+          <a:xfrm>
+            <a:off x="4387766" y="4449870"/>
+            <a:ext cx="1122762" cy="577081"/>
+          </a:xfrm>
+          <a:prstGeom prst="rect">
+            <a:avLst/>
+          </a:prstGeom>
+          <a:noFill/>
+        </p:spPr>
+        <p:txBody>
+          <a:bodyPr wrap="square" rtlCol="0">
+            <a:spAutoFit/>
+          </a:bodyPr>
+          <a:lstStyle/>
+          <a:p>
+            <a:pPr algn="ctr"/>
+            <a:r>
+              <a:rPr lang="en-GB" sz="1050" dirty="0">
+                <a:latin typeface="Avenir Book" panose="02000503020000020003" pitchFamily="2" charset="0"/>
+              </a:rPr>
+              <a:t>Signal Recycling Mirror</a:t>
+            </a:r>
+            <a:endParaRPr lang="en-US" sz="1050" dirty="0">
+              <a:latin typeface="Avenir Book" panose="02000503020000020003" pitchFamily="2" charset="0"/>
+            </a:endParaRPr>
+          </a:p>
+          <a:p>
+            <a:pPr algn="r"/>
+            <a:endParaRPr lang="en-US" sz="1050" dirty="0">
+              <a:latin typeface="Avenir Book" panose="02000503020000020003" pitchFamily="2" charset="0"/>
+            </a:endParaRPr>
+          </a:p>
+        </p:txBody>
+      </p:sp>
+      <p:sp>
+        <p:nvSpPr>
+          <p:cNvPr id="199" name="TextBox 198">
+            <a:extLst>
+              <a:ext uri="{FF2B5EF4-FFF2-40B4-BE49-F238E27FC236}">
+                <a16:creationId xmlns:a16="http://schemas.microsoft.com/office/drawing/2014/main" id="{F3CDF520-EEB9-5696-47E4-F77CE0F634E1}"/>
+              </a:ext>
+            </a:extLst>
+          </p:cNvPr>
+          <p:cNvSpPr txBox="1"/>
+          <p:nvPr/>
+        </p:nvSpPr>
+        <p:spPr>
+          <a:xfrm>
+            <a:off x="3184158" y="5330200"/>
+            <a:ext cx="1122762" cy="415498"/>
+          </a:xfrm>
+          <a:prstGeom prst="rect">
+            <a:avLst/>
+          </a:prstGeom>
+          <a:noFill/>
+        </p:spPr>
+        <p:txBody>
+          <a:bodyPr wrap="square" rtlCol="0">
+            <a:spAutoFit/>
+          </a:bodyPr>
+          <a:lstStyle/>
+          <a:p>
+            <a:pPr algn="ctr"/>
+            <a:r>
+              <a:rPr lang="en-GB" sz="1050" dirty="0">
+                <a:latin typeface="Avenir Book" panose="02000503020000020003" pitchFamily="2" charset="0"/>
+              </a:rPr>
+              <a:t>Photodetector</a:t>
+            </a:r>
+            <a:endParaRPr lang="en-US" sz="1050" dirty="0">
+              <a:latin typeface="Avenir Book" panose="02000503020000020003" pitchFamily="2" charset="0"/>
+            </a:endParaRPr>
+          </a:p>
+          <a:p>
+            <a:pPr algn="r"/>
+            <a:endParaRPr lang="en-US" sz="1050" dirty="0">
+              <a:latin typeface="Avenir Book" panose="02000503020000020003" pitchFamily="2" charset="0"/>
+            </a:endParaRPr>
+          </a:p>
+        </p:txBody>
+      </p:sp>
+      <p:sp>
+        <p:nvSpPr>
+          <p:cNvPr id="200" name="TextBox 199">
+            <a:extLst>
+              <a:ext uri="{FF2B5EF4-FFF2-40B4-BE49-F238E27FC236}">
+                <a16:creationId xmlns:a16="http://schemas.microsoft.com/office/drawing/2014/main" id="{0B89FBD6-3097-CD1F-751F-23076A34AA18}"/>
+              </a:ext>
+            </a:extLst>
+          </p:cNvPr>
+          <p:cNvSpPr txBox="1"/>
+          <p:nvPr/>
+        </p:nvSpPr>
+        <p:spPr>
+          <a:xfrm>
+            <a:off x="1902498" y="3494433"/>
+            <a:ext cx="1122762" cy="415498"/>
+          </a:xfrm>
+          <a:prstGeom prst="rect">
+            <a:avLst/>
+          </a:prstGeom>
+          <a:noFill/>
+        </p:spPr>
+        <p:txBody>
+          <a:bodyPr wrap="square" rtlCol="0">
+            <a:spAutoFit/>
+          </a:bodyPr>
+          <a:lstStyle/>
+          <a:p>
+            <a:pPr algn="ctr"/>
+            <a:r>
+              <a:rPr lang="en-GB" sz="1050" dirty="0">
+                <a:latin typeface="Avenir Book" panose="02000503020000020003" pitchFamily="2" charset="0"/>
+              </a:rPr>
+              <a:t>From Input Optics</a:t>
+            </a:r>
+            <a:endParaRPr lang="en-US" sz="1050" dirty="0">
+              <a:latin typeface="Avenir Book" panose="02000503020000020003" pitchFamily="2" charset="0"/>
+            </a:endParaRPr>
+          </a:p>
+          <a:p>
+            <a:pPr algn="r"/>
+            <a:endParaRPr lang="en-US" sz="1050" dirty="0">
+              <a:latin typeface="Avenir Book" panose="02000503020000020003" pitchFamily="2" charset="0"/>
+            </a:endParaRPr>
+          </a:p>
+        </p:txBody>
+      </p:sp>
+      <p:sp>
+        <p:nvSpPr>
+          <p:cNvPr id="201" name="TextBox 200">
+            <a:extLst>
+              <a:ext uri="{FF2B5EF4-FFF2-40B4-BE49-F238E27FC236}">
+                <a16:creationId xmlns:a16="http://schemas.microsoft.com/office/drawing/2014/main" id="{709BC44B-4BA2-462D-7D14-5791687B1D90}"/>
+              </a:ext>
+            </a:extLst>
+          </p:cNvPr>
+          <p:cNvSpPr txBox="1"/>
+          <p:nvPr/>
+        </p:nvSpPr>
+        <p:spPr>
+          <a:xfrm>
+            <a:off x="2908022" y="2998949"/>
+            <a:ext cx="1122762" cy="577081"/>
+          </a:xfrm>
+          <a:prstGeom prst="rect">
+            <a:avLst/>
+          </a:prstGeom>
+          <a:noFill/>
+        </p:spPr>
+        <p:txBody>
+          <a:bodyPr wrap="square" rtlCol="0">
+            <a:spAutoFit/>
+          </a:bodyPr>
+          <a:lstStyle/>
+          <a:p>
+            <a:pPr algn="ctr"/>
+            <a:r>
+              <a:rPr lang="en-GB" sz="1050" dirty="0">
+                <a:latin typeface="Avenir Book" panose="02000503020000020003" pitchFamily="2" charset="0"/>
+              </a:rPr>
+              <a:t>Power Recycling Mirror</a:t>
+            </a:r>
+            <a:endParaRPr lang="en-US" sz="1050" dirty="0">
+              <a:latin typeface="Avenir Book" panose="02000503020000020003" pitchFamily="2" charset="0"/>
+            </a:endParaRPr>
+          </a:p>
+          <a:p>
+            <a:pPr algn="r"/>
+            <a:endParaRPr lang="en-US" sz="1050" dirty="0">
+              <a:latin typeface="Avenir Book" panose="02000503020000020003" pitchFamily="2" charset="0"/>
+            </a:endParaRPr>
+          </a:p>
+        </p:txBody>
+      </p:sp>
+      <p:sp>
+        <p:nvSpPr>
+          <p:cNvPr id="202" name="TextBox 201">
+            <a:extLst>
+              <a:ext uri="{FF2B5EF4-FFF2-40B4-BE49-F238E27FC236}">
+                <a16:creationId xmlns:a16="http://schemas.microsoft.com/office/drawing/2014/main" id="{8D722CE8-3BC7-043A-FFC8-4BC153F747FA}"/>
+              </a:ext>
+            </a:extLst>
+          </p:cNvPr>
+          <p:cNvSpPr txBox="1"/>
+          <p:nvPr/>
+        </p:nvSpPr>
+        <p:spPr>
+          <a:xfrm>
+            <a:off x="5834468" y="5061520"/>
+            <a:ext cx="1122762" cy="415498"/>
+          </a:xfrm>
+          <a:prstGeom prst="rect">
+            <a:avLst/>
+          </a:prstGeom>
+          <a:noFill/>
+        </p:spPr>
+        <p:txBody>
+          <a:bodyPr wrap="square" rtlCol="0">
+            <a:spAutoFit/>
+          </a:bodyPr>
+          <a:lstStyle/>
+          <a:p>
+            <a:pPr algn="ctr"/>
+            <a:r>
+              <a:rPr lang="en-GB" sz="1050" dirty="0">
+                <a:latin typeface="Avenir Book" panose="02000503020000020003" pitchFamily="2" charset="0"/>
+              </a:rPr>
+              <a:t>Output Data</a:t>
+            </a:r>
+            <a:endParaRPr lang="en-US" sz="1050" dirty="0">
+              <a:latin typeface="Avenir Book" panose="02000503020000020003" pitchFamily="2" charset="0"/>
+            </a:endParaRPr>
+          </a:p>
+          <a:p>
+            <a:pPr algn="r"/>
+            <a:endParaRPr lang="en-US" sz="1050" dirty="0">
+              <a:latin typeface="Avenir Book" panose="02000503020000020003" pitchFamily="2" charset="0"/>
+            </a:endParaRPr>
+          </a:p>
+        </p:txBody>
+      </p:sp>
+      <p:sp>
+        <p:nvSpPr>
+          <p:cNvPr id="203" name="TextBox 202">
+            <a:extLst>
+              <a:ext uri="{FF2B5EF4-FFF2-40B4-BE49-F238E27FC236}">
+                <a16:creationId xmlns:a16="http://schemas.microsoft.com/office/drawing/2014/main" id="{2FF2224C-601D-D4B9-B73B-89A6300C6457}"/>
+              </a:ext>
+            </a:extLst>
+          </p:cNvPr>
+          <p:cNvSpPr txBox="1"/>
+          <p:nvPr/>
+        </p:nvSpPr>
+        <p:spPr>
+          <a:xfrm>
+            <a:off x="3031248" y="4092025"/>
+            <a:ext cx="1122762" cy="415498"/>
+          </a:xfrm>
+          <a:prstGeom prst="rect">
+            <a:avLst/>
+          </a:prstGeom>
+          <a:noFill/>
+        </p:spPr>
+        <p:txBody>
+          <a:bodyPr wrap="square" rtlCol="0">
+            <a:spAutoFit/>
+          </a:bodyPr>
+          <a:lstStyle/>
+          <a:p>
+            <a:pPr algn="ctr"/>
+            <a:r>
+              <a:rPr lang="en-GB" sz="1050" dirty="0">
+                <a:latin typeface="Avenir Book" panose="02000503020000020003" pitchFamily="2" charset="0"/>
+              </a:rPr>
+              <a:t>Beam Splitter</a:t>
+            </a:r>
+            <a:endParaRPr lang="en-US" sz="1050" dirty="0">
+              <a:latin typeface="Avenir Book" panose="02000503020000020003" pitchFamily="2" charset="0"/>
+            </a:endParaRPr>
+          </a:p>
+          <a:p>
+            <a:pPr algn="r"/>
+            <a:endParaRPr lang="en-US" sz="1050" dirty="0">
+              <a:latin typeface="Avenir Book" panose="02000503020000020003" pitchFamily="2" charset="0"/>
+            </a:endParaRPr>
+          </a:p>
+        </p:txBody>
+      </p:sp>
     </p:spTree>
     <p:extLst>
       <p:ext uri="{BB962C8B-B14F-4D97-AF65-F5344CB8AC3E}">

</xml_diff>